<commit_message>
Added QR code for VS community
</commit_message>
<xml_diff>
--- a/Sviluppo Software.pptx
+++ b/Sviluppo Software.pptx
@@ -5,23 +5,24 @@
     <p:sldMasterId id="2147483651" r:id="rId4"/>
   </p:sldMasterIdLst>
   <p:notesMasterIdLst>
-    <p:notesMasterId r:id="rId16"/>
+    <p:notesMasterId r:id="rId17"/>
   </p:notesMasterIdLst>
   <p:handoutMasterIdLst>
-    <p:handoutMasterId r:id="rId17"/>
+    <p:handoutMasterId r:id="rId18"/>
   </p:handoutMasterIdLst>
   <p:sldIdLst>
     <p:sldId id="293" r:id="rId5"/>
-    <p:sldId id="528" r:id="rId6"/>
-    <p:sldId id="530" r:id="rId7"/>
-    <p:sldId id="529" r:id="rId8"/>
-    <p:sldId id="532" r:id="rId9"/>
-    <p:sldId id="531" r:id="rId10"/>
-    <p:sldId id="533" r:id="rId11"/>
-    <p:sldId id="539" r:id="rId12"/>
-    <p:sldId id="534" r:id="rId13"/>
-    <p:sldId id="537" r:id="rId14"/>
-    <p:sldId id="538" r:id="rId15"/>
+    <p:sldId id="540" r:id="rId6"/>
+    <p:sldId id="528" r:id="rId7"/>
+    <p:sldId id="530" r:id="rId8"/>
+    <p:sldId id="529" r:id="rId9"/>
+    <p:sldId id="532" r:id="rId10"/>
+    <p:sldId id="531" r:id="rId11"/>
+    <p:sldId id="533" r:id="rId12"/>
+    <p:sldId id="539" r:id="rId13"/>
+    <p:sldId id="534" r:id="rId14"/>
+    <p:sldId id="537" r:id="rId15"/>
+    <p:sldId id="538" r:id="rId16"/>
   </p:sldIdLst>
   <p:sldSz cx="11880850" cy="6840538"/>
   <p:notesSz cx="6797675" cy="9926638"/>
@@ -263,7 +264,7 @@
           <a:p>
             <a:fld id="{F3ECCCF9-49CE-42F6-A23A-8E4AC2EFFAFE}" type="datetimeFigureOut">
               <a:rPr lang="it-IT" smtClean="0"/>
-              <a:t>06/12/2016</a:t>
+              <a:t>08/12/2016</a:t>
             </a:fld>
             <a:endParaRPr lang="it-IT"/>
           </a:p>
@@ -1234,7 +1235,7 @@
             <a:fld id="{B4BDCE43-8D42-4382-A0DD-849D3C6434DB}" type="datetime1">
               <a:rPr lang="it-IT" smtClean="0"/>
               <a:pPr/>
-              <a:t>06/12/2016</a:t>
+              <a:t>08/12/2016</a:t>
             </a:fld>
             <a:endParaRPr lang="it-IT" dirty="0"/>
           </a:p>
@@ -1471,7 +1472,7 @@
           <a:p>
             <a:fld id="{C8C33378-5A52-4351-907E-04F015C42420}" type="datetime1">
               <a:rPr lang="it-IT" smtClean="0"/>
-              <a:t>06/12/2016</a:t>
+              <a:t>08/12/2016</a:t>
             </a:fld>
             <a:endParaRPr lang="it-IT" dirty="0"/>
           </a:p>
@@ -2344,120 +2345,128 @@
           <a:bodyPr/>
           <a:lstStyle/>
           <a:p>
+            <a:pPr marL="0" indent="0">
+              <a:buNone/>
+            </a:pPr>
+            <a:r>
+              <a:rPr lang="it-IT" dirty="0"/>
+              <a:t>Ogni programma in C#:</a:t>
+            </a:r>
+          </a:p>
+          <a:p>
+            <a:r>
+              <a:rPr lang="it-IT" dirty="0"/>
+              <a:t>consiste di </a:t>
+            </a:r>
             <a:r>
               <a:rPr lang="it-IT" b="1" dirty="0">
                 <a:solidFill>
                   <a:srgbClr val="C00000"/>
                 </a:solidFill>
               </a:rPr>
-              <a:t>Code Style</a:t>
-            </a:r>
+              <a:t>uno o più file .cs</a:t>
+            </a:r>
+            <a:endParaRPr lang="it-IT" dirty="0"/>
+          </a:p>
+          <a:p>
             <a:r>
               <a:rPr lang="it-IT" dirty="0"/>
-              <a:t>: insieme di sane abitudini, oltre alla scrittura corretta del codice.</a:t>
-            </a:r>
-          </a:p>
-          <a:p>
-            <a:endParaRPr lang="it-IT" dirty="0"/>
-          </a:p>
-          <a:p>
-            <a:r>
-              <a:rPr lang="it-IT" dirty="0"/>
-              <a:t>Ad esempio:</a:t>
-            </a:r>
-          </a:p>
-          <a:p>
-            <a:pPr lvl="1"/>
-            <a:r>
-              <a:rPr lang="it-IT" sz="1400" b="1" dirty="0">
+              <a:t>deve contenere una </a:t>
+            </a:r>
+            <a:r>
+              <a:rPr lang="it-IT" b="1" dirty="0">
                 <a:solidFill>
                   <a:srgbClr val="C00000"/>
                 </a:solidFill>
               </a:rPr>
-              <a:t>indentare</a:t>
-            </a:r>
-            <a:r>
-              <a:rPr lang="it-IT" sz="1400" b="1" dirty="0"/>
-              <a:t> </a:t>
-            </a:r>
-            <a:r>
-              <a:rPr lang="it-IT" sz="1400" dirty="0"/>
-              <a:t>il codice</a:t>
-            </a:r>
-          </a:p>
-          <a:p>
-            <a:pPr lvl="1"/>
-            <a:r>
-              <a:rPr lang="it-IT" sz="1400" b="1" dirty="0">
+              <a:t>funzione main specifica</a:t>
+            </a:r>
+            <a:r>
+              <a:rPr lang="it-IT" dirty="0"/>
+              <a:t>, di questo formato:</a:t>
+            </a:r>
+            <a:br>
+              <a:rPr lang="it-IT" dirty="0"/>
+            </a:br>
+            <a:br>
+              <a:rPr lang="it-IT" sz="1000" dirty="0"/>
+            </a:br>
+            <a:r>
+              <a:rPr lang="it-IT" dirty="0">
+                <a:latin typeface="Courier New" panose="02070309020205020404" pitchFamily="49" charset="0"/>
+                <a:cs typeface="Courier New" panose="02070309020205020404" pitchFamily="49" charset="0"/>
+              </a:rPr>
+              <a:t>static void Main(string[] args) { ... }</a:t>
+            </a:r>
+          </a:p>
+          <a:p>
+            <a:endParaRPr lang="it-IT" dirty="0">
+              <a:latin typeface="Courier New" panose="02070309020205020404" pitchFamily="49" charset="0"/>
+              <a:cs typeface="Courier New" panose="02070309020205020404" pitchFamily="49" charset="0"/>
+            </a:endParaRPr>
+          </a:p>
+          <a:p>
+            <a:pPr marL="0" indent="0">
+              <a:buNone/>
+            </a:pPr>
+            <a:r>
+              <a:rPr lang="it-IT" dirty="0"/>
+              <a:t>La sintassi del linguaggio C# consiste di (</a:t>
+            </a:r>
+            <a:r>
+              <a:rPr lang="it-IT" u="sng" dirty="0">
+                <a:hlinkClick r:id="rId2"/>
+              </a:rPr>
+              <a:t>https://msdn.microsoft.com/it-it/library/z1zx9t92.aspx</a:t>
+            </a:r>
+            <a:r>
+              <a:rPr lang="it-IT" dirty="0"/>
+              <a:t>):</a:t>
+            </a:r>
+          </a:p>
+          <a:p>
+            <a:r>
+              <a:rPr lang="it-IT" dirty="0"/>
+              <a:t>struttura generale del programma (funzioni, variabili, costanti, operazioni)</a:t>
+            </a:r>
+          </a:p>
+          <a:p>
+            <a:r>
+              <a:rPr lang="it-IT" dirty="0"/>
+              <a:t>strutture di controllo (if, for, while, switch)</a:t>
+            </a:r>
+          </a:p>
+          <a:p>
+            <a:endParaRPr lang="it-IT" i="1" dirty="0">
+              <a:solidFill>
+                <a:srgbClr val="C00000"/>
+              </a:solidFill>
+            </a:endParaRPr>
+          </a:p>
+          <a:p>
+            <a:r>
+              <a:rPr lang="it-IT" i="1" dirty="0"/>
+              <a:t>classi e </a:t>
+            </a:r>
+            <a:r>
+              <a:rPr lang="it-IT" b="1" i="1" dirty="0">
                 <a:solidFill>
                   <a:srgbClr val="C00000"/>
                 </a:solidFill>
               </a:rPr>
-              <a:t>commentare</a:t>
-            </a:r>
-            <a:r>
-              <a:rPr lang="it-IT" sz="1400" b="1" dirty="0"/>
-              <a:t> </a:t>
-            </a:r>
-            <a:r>
-              <a:rPr lang="it-IT" sz="1400" dirty="0"/>
-              <a:t>il codice (per se stessi e per gli altri)</a:t>
-            </a:r>
-          </a:p>
-          <a:p>
-            <a:pPr lvl="1"/>
-            <a:r>
-              <a:rPr lang="it-IT" sz="1400" dirty="0"/>
-              <a:t>scegliere un </a:t>
-            </a:r>
-            <a:r>
-              <a:rPr lang="it-IT" sz="1400" b="1" dirty="0">
-                <a:solidFill>
-                  <a:srgbClr val="C00000"/>
-                </a:solidFill>
-              </a:rPr>
-              <a:t>modo coerente </a:t>
-            </a:r>
-            <a:r>
-              <a:rPr lang="it-IT" sz="1400" dirty="0"/>
-              <a:t>di scrivere il codice (parentesi graffe a capo o non a capo, spaziature...)</a:t>
-            </a:r>
-          </a:p>
-          <a:p>
-            <a:pPr lvl="1"/>
-            <a:r>
-              <a:rPr lang="it-IT" sz="1400" dirty="0"/>
-              <a:t>scegliere </a:t>
-            </a:r>
-            <a:r>
-              <a:rPr lang="it-IT" sz="1400" b="1" dirty="0">
-                <a:solidFill>
-                  <a:srgbClr val="C00000"/>
-                </a:solidFill>
-              </a:rPr>
-              <a:t>nomi lunghi </a:t>
-            </a:r>
-            <a:r>
-              <a:rPr lang="it-IT" sz="1400" dirty="0"/>
-              <a:t>ed </a:t>
-            </a:r>
-            <a:r>
-              <a:rPr lang="it-IT" sz="1400" b="1" dirty="0">
-                <a:solidFill>
-                  <a:srgbClr val="C00000"/>
-                </a:solidFill>
-              </a:rPr>
-              <a:t>esplicativi</a:t>
-            </a:r>
-            <a:r>
-              <a:rPr lang="it-IT" sz="1400" b="1" dirty="0"/>
-              <a:t> </a:t>
-            </a:r>
-            <a:r>
-              <a:rPr lang="it-IT" sz="1400" dirty="0"/>
-              <a:t>per le variabili</a:t>
-            </a:r>
-            <a:endParaRPr lang="it-IT" sz="1400" dirty="0"/>
+              <a:t>oggetti</a:t>
+            </a:r>
+            <a:endParaRPr lang="it-IT" i="1" dirty="0">
+              <a:solidFill>
+                <a:srgbClr val="C00000"/>
+              </a:solidFill>
+            </a:endParaRPr>
+          </a:p>
+          <a:p>
+            <a:endParaRPr lang="it-IT" dirty="0">
+              <a:latin typeface="Courier New" panose="02070309020205020404" pitchFamily="49" charset="0"/>
+              <a:cs typeface="Courier New" panose="02070309020205020404" pitchFamily="49" charset="0"/>
+            </a:endParaRPr>
           </a:p>
         </p:txBody>
       </p:sp>
@@ -2477,11 +2486,12 @@
           <a:lstStyle/>
           <a:p>
             <a:r>
-              <a:rPr lang="it-IT" sz="2800" dirty="0">
-                <a:effectLst/>
-              </a:rPr>
-              <a:t>Quando scriviamo codice....</a:t>
-            </a:r>
+              <a:rPr lang="it-IT" dirty="0"/>
+              <a:t>Come è fatto un programma C#</a:t>
+            </a:r>
+            <a:endParaRPr lang="it-IT" sz="2800" dirty="0">
+              <a:effectLst/>
+            </a:endParaRPr>
           </a:p>
         </p:txBody>
       </p:sp>
@@ -2517,7 +2527,7 @@
     </p:spTree>
     <p:extLst>
       <p:ext uri="{BB962C8B-B14F-4D97-AF65-F5344CB8AC3E}">
-        <p14:creationId xmlns:p14="http://schemas.microsoft.com/office/powerpoint/2010/main" val="3497858168"/>
+        <p14:creationId xmlns:p14="http://schemas.microsoft.com/office/powerpoint/2010/main" val="715918362"/>
       </p:ext>
     </p:extLst>
   </p:cSld>
@@ -2565,104 +2575,113 @@
                   <a:srgbClr val="C00000"/>
                 </a:solidFill>
               </a:rPr>
-              <a:t>Esercizio 1</a:t>
+              <a:t>Code Style</a:t>
             </a:r>
             <a:r>
               <a:rPr lang="it-IT" dirty="0"/>
-              <a:t>: scrivete un programma che, letti due numeri interi da terminale, restituisca il loro rapporto.</a:t>
-            </a:r>
-          </a:p>
-          <a:p>
-            <a:r>
-              <a:rPr lang="it-IT" b="1" dirty="0">
+              <a:t>: insieme di sane abitudini, oltre alla scrittura corretta del codice.</a:t>
+            </a:r>
+          </a:p>
+          <a:p>
+            <a:endParaRPr lang="it-IT" dirty="0"/>
+          </a:p>
+          <a:p>
+            <a:r>
+              <a:rPr lang="it-IT" dirty="0"/>
+              <a:t>Ad esempio:</a:t>
+            </a:r>
+          </a:p>
+          <a:p>
+            <a:pPr lvl="1"/>
+            <a:r>
+              <a:rPr lang="it-IT" sz="1400" b="1" dirty="0">
                 <a:solidFill>
                   <a:srgbClr val="C00000"/>
                 </a:solidFill>
               </a:rPr>
-              <a:t>Esercizio 2</a:t>
-            </a:r>
-            <a:r>
-              <a:rPr lang="it-IT" dirty="0"/>
-              <a:t>: Scrivere un programma che scrive a terminale la radice quadrata di 2, il cubo di 2 il seno di pigreco/4.</a:t>
-            </a:r>
-          </a:p>
-          <a:p>
-            <a:r>
-              <a:rPr lang="it-IT" b="1" dirty="0">
+              <a:t>indentare</a:t>
+            </a:r>
+            <a:r>
+              <a:rPr lang="it-IT" sz="1400" b="1" dirty="0"/>
+              <a:t> </a:t>
+            </a:r>
+            <a:r>
+              <a:rPr lang="it-IT" sz="1400" dirty="0"/>
+              <a:t>il codice</a:t>
+            </a:r>
+          </a:p>
+          <a:p>
+            <a:pPr lvl="1"/>
+            <a:r>
+              <a:rPr lang="it-IT" sz="1400" b="1" dirty="0">
                 <a:solidFill>
                   <a:srgbClr val="C00000"/>
                 </a:solidFill>
               </a:rPr>
-              <a:t>Esercizio 3</a:t>
-            </a:r>
-            <a:r>
-              <a:rPr lang="it-IT" dirty="0"/>
-              <a:t>: Scrivere un programma che chieda all'utente di inserire un intero a scelta tra 1 e 2, e restituisca a terminale il valore inserito, o un messaggio di errore in caso di inserimento di altri interi.</a:t>
-            </a:r>
-          </a:p>
-          <a:p>
-            <a:r>
-              <a:rPr lang="it-IT" b="1" dirty="0">
+              <a:t>commentare</a:t>
+            </a:r>
+            <a:r>
+              <a:rPr lang="it-IT" sz="1400" b="1" dirty="0"/>
+              <a:t> </a:t>
+            </a:r>
+            <a:r>
+              <a:rPr lang="it-IT" sz="1400" dirty="0"/>
+              <a:t>il codice (per se stessi e per gli altri)</a:t>
+            </a:r>
+          </a:p>
+          <a:p>
+            <a:pPr lvl="1"/>
+            <a:r>
+              <a:rPr lang="it-IT" sz="1400" dirty="0"/>
+              <a:t>scegliere un </a:t>
+            </a:r>
+            <a:r>
+              <a:rPr lang="it-IT" sz="1400" b="1" dirty="0">
                 <a:solidFill>
                   <a:srgbClr val="C00000"/>
                 </a:solidFill>
               </a:rPr>
-              <a:t>Esercizio 4</a:t>
-            </a:r>
-            <a:r>
-              <a:rPr lang="it-IT" dirty="0"/>
-              <a:t>: Scrivere un programma che, dato un array di n interi casuali, lo ordini dal piu piccolo al piu grande (suggerimento: create un array specificando voi alcuni numeri a caso per testare che l'ordinamento funzioni).</a:t>
-            </a:r>
-          </a:p>
-          <a:p>
-            <a:r>
-              <a:rPr lang="it-IT" b="1" dirty="0">
+              <a:t>modo coerente </a:t>
+            </a:r>
+            <a:r>
+              <a:rPr lang="it-IT" sz="1400" dirty="0"/>
+              <a:t>di scrivere il codice (parentesi graffe a capo o non a capo, spaziature...)</a:t>
+            </a:r>
+          </a:p>
+          <a:p>
+            <a:pPr lvl="1"/>
+            <a:r>
+              <a:rPr lang="it-IT" sz="1400" dirty="0"/>
+              <a:t>scegliere </a:t>
+            </a:r>
+            <a:r>
+              <a:rPr lang="it-IT" sz="1400" b="1" dirty="0">
                 <a:solidFill>
                   <a:srgbClr val="C00000"/>
                 </a:solidFill>
               </a:rPr>
-              <a:t>Esercizio 5</a:t>
-            </a:r>
-            <a:r>
-              <a:rPr lang="it-IT" dirty="0"/>
-              <a:t>: Scrivere una funzione che calcoli il fattoriale di un numero intero non negativo.</a:t>
-            </a:r>
-          </a:p>
-          <a:p>
-            <a:r>
-              <a:rPr lang="it-IT" b="1" dirty="0">
+              <a:t>nomi lunghi </a:t>
+            </a:r>
+            <a:r>
+              <a:rPr lang="it-IT" sz="1400" dirty="0"/>
+              <a:t>ed </a:t>
+            </a:r>
+            <a:r>
+              <a:rPr lang="it-IT" sz="1400" b="1" dirty="0">
                 <a:solidFill>
                   <a:srgbClr val="C00000"/>
                 </a:solidFill>
               </a:rPr>
-              <a:t>Esercizio 6</a:t>
-            </a:r>
-            <a:r>
-              <a:rPr lang="it-IT" dirty="0"/>
-              <a:t>: Scrivere la funzione fattoriale in modo ricorsivo, cioe facendo in modo che la funzione che calcola il fattoriale chiami se stessa.</a:t>
-            </a:r>
-          </a:p>
-          <a:p>
-            <a:r>
-              <a:rPr lang="it-IT" b="1" dirty="0">
-                <a:solidFill>
-                  <a:srgbClr val="C00000"/>
-                </a:solidFill>
-              </a:rPr>
-              <a:t>Esercizio 7</a:t>
-            </a:r>
-            <a:r>
-              <a:rPr lang="it-IT" b="1" dirty="0"/>
-              <a:t>: </a:t>
-            </a:r>
-            <a:r>
-              <a:rPr lang="it-IT" dirty="0"/>
-              <a:t>Scrivere un programma che, data una stringa, restituisca un conteggio delle lettere in essa presenti (si consiglia di usare un array con 26 posizioni, una per ogni lettera dell'alfabeto, inizializzato tutto a zeri scorrere la stringa e incrementare il contatore della lettera corrispondente).</a:t>
-            </a:r>
-            <a:endParaRPr lang="it-IT" dirty="0">
-              <a:latin typeface="Courier New" panose="02070309020205020404" pitchFamily="49" charset="0"/>
-              <a:cs typeface="Courier New" panose="02070309020205020404" pitchFamily="49" charset="0"/>
-            </a:endParaRPr>
+              <a:t>esplicativi</a:t>
+            </a:r>
+            <a:r>
+              <a:rPr lang="it-IT" sz="1400" b="1" dirty="0"/>
+              <a:t> </a:t>
+            </a:r>
+            <a:r>
+              <a:rPr lang="it-IT" sz="1400" dirty="0"/>
+              <a:t>per le variabili</a:t>
+            </a:r>
           </a:p>
         </p:txBody>
       </p:sp>
@@ -2682,12 +2701,11 @@
           <a:lstStyle/>
           <a:p>
             <a:r>
-              <a:rPr lang="it-IT" dirty="0"/>
-              <a:t>Esercizi</a:t>
-            </a:r>
-            <a:endParaRPr lang="it-IT" sz="2800" dirty="0">
-              <a:effectLst/>
-            </a:endParaRPr>
+              <a:rPr lang="it-IT" sz="2800" dirty="0">
+                <a:effectLst/>
+              </a:rPr>
+              <a:t>Quando scriviamo codice....</a:t>
+            </a:r>
           </a:p>
         </p:txBody>
       </p:sp>
@@ -2715,6 +2733,212 @@
               <a:rPr lang="it-IT" smtClean="0"/>
               <a:pPr/>
               <a:t>11</a:t>
+            </a:fld>
+            <a:endParaRPr lang="it-IT"/>
+          </a:p>
+        </p:txBody>
+      </p:sp>
+    </p:spTree>
+    <p:extLst>
+      <p:ext uri="{BB962C8B-B14F-4D97-AF65-F5344CB8AC3E}">
+        <p14:creationId xmlns:p14="http://schemas.microsoft.com/office/powerpoint/2010/main" val="3497858168"/>
+      </p:ext>
+    </p:extLst>
+  </p:cSld>
+  <p:clrMapOvr>
+    <a:masterClrMapping/>
+  </p:clrMapOvr>
+</p:sld>
+</file>
+
+<file path=ppt/slides/slide12.xml><?xml version="1.0" encoding="utf-8"?>
+<p:sld xmlns:a="http://schemas.openxmlformats.org/drawingml/2006/main" xmlns:r="http://schemas.openxmlformats.org/officeDocument/2006/relationships" xmlns:p="http://schemas.openxmlformats.org/presentationml/2006/main">
+  <p:cSld>
+    <p:spTree>
+      <p:nvGrpSpPr>
+        <p:cNvPr id="1" name=""/>
+        <p:cNvGrpSpPr/>
+        <p:nvPr/>
+      </p:nvGrpSpPr>
+      <p:grpSpPr>
+        <a:xfrm>
+          <a:off x="0" y="0"/>
+          <a:ext cx="0" cy="0"/>
+          <a:chOff x="0" y="0"/>
+          <a:chExt cx="0" cy="0"/>
+        </a:xfrm>
+      </p:grpSpPr>
+      <p:sp>
+        <p:nvSpPr>
+          <p:cNvPr id="2" name="Content Placeholder 1"/>
+          <p:cNvSpPr>
+            <a:spLocks noGrp="1"/>
+          </p:cNvSpPr>
+          <p:nvPr>
+            <p:ph idx="1"/>
+          </p:nvPr>
+        </p:nvSpPr>
+        <p:spPr/>
+        <p:txBody>
+          <a:bodyPr/>
+          <a:lstStyle/>
+          <a:p>
+            <a:r>
+              <a:rPr lang="it-IT" b="1" dirty="0">
+                <a:solidFill>
+                  <a:srgbClr val="C00000"/>
+                </a:solidFill>
+              </a:rPr>
+              <a:t>Esercizio 1</a:t>
+            </a:r>
+            <a:r>
+              <a:rPr lang="it-IT" dirty="0"/>
+              <a:t>: scrivete un programma che, letti due numeri interi da terminale, restituisca il loro rapporto.</a:t>
+            </a:r>
+          </a:p>
+          <a:p>
+            <a:r>
+              <a:rPr lang="it-IT" b="1" dirty="0">
+                <a:solidFill>
+                  <a:srgbClr val="C00000"/>
+                </a:solidFill>
+              </a:rPr>
+              <a:t>Esercizio 2</a:t>
+            </a:r>
+            <a:r>
+              <a:rPr lang="it-IT" dirty="0"/>
+              <a:t>: Scrivere un programma che scrive a terminale la radice quadrata di 2, il cubo di 2 il seno di pigreco/4.</a:t>
+            </a:r>
+          </a:p>
+          <a:p>
+            <a:r>
+              <a:rPr lang="it-IT" b="1" dirty="0">
+                <a:solidFill>
+                  <a:srgbClr val="C00000"/>
+                </a:solidFill>
+              </a:rPr>
+              <a:t>Esercizio 3</a:t>
+            </a:r>
+            <a:r>
+              <a:rPr lang="it-IT" dirty="0"/>
+              <a:t>: Scrivere un programma che chieda all'utente di inserire un intero a scelta tra 1 e 2, e restituisca a terminale il valore inserito, o un messaggio di errore in caso di inserimento di altri interi.</a:t>
+            </a:r>
+          </a:p>
+          <a:p>
+            <a:r>
+              <a:rPr lang="it-IT" b="1" dirty="0">
+                <a:solidFill>
+                  <a:srgbClr val="C00000"/>
+                </a:solidFill>
+              </a:rPr>
+              <a:t>Esercizio 4</a:t>
+            </a:r>
+            <a:r>
+              <a:rPr lang="it-IT" dirty="0"/>
+              <a:t>: Scrivere un programma che, dato un array di n interi casuali, lo ordini dal piu piccolo al piu grande (suggerimento: create un array specificando voi alcuni numeri a caso per testare che l'ordinamento funzioni).</a:t>
+            </a:r>
+          </a:p>
+          <a:p>
+            <a:r>
+              <a:rPr lang="it-IT" b="1" dirty="0">
+                <a:solidFill>
+                  <a:srgbClr val="C00000"/>
+                </a:solidFill>
+              </a:rPr>
+              <a:t>Esercizio 5</a:t>
+            </a:r>
+            <a:r>
+              <a:rPr lang="it-IT" dirty="0"/>
+              <a:t>: Scrivere una funzione che calcoli il fattoriale di un numero intero non negativo.</a:t>
+            </a:r>
+          </a:p>
+          <a:p>
+            <a:r>
+              <a:rPr lang="it-IT" b="1" dirty="0">
+                <a:solidFill>
+                  <a:srgbClr val="C00000"/>
+                </a:solidFill>
+              </a:rPr>
+              <a:t>Esercizio 6</a:t>
+            </a:r>
+            <a:r>
+              <a:rPr lang="it-IT" dirty="0"/>
+              <a:t>: Scrivere la funzione fattoriale in modo ricorsivo, cioe facendo in modo che la funzione che calcola il fattoriale chiami se stessa.</a:t>
+            </a:r>
+          </a:p>
+          <a:p>
+            <a:r>
+              <a:rPr lang="it-IT" b="1" dirty="0">
+                <a:solidFill>
+                  <a:srgbClr val="C00000"/>
+                </a:solidFill>
+              </a:rPr>
+              <a:t>Esercizio 7</a:t>
+            </a:r>
+            <a:r>
+              <a:rPr lang="it-IT" b="1" dirty="0"/>
+              <a:t>: </a:t>
+            </a:r>
+            <a:r>
+              <a:rPr lang="it-IT" dirty="0"/>
+              <a:t>Scrivere un programma che, data una stringa, restituisca un conteggio delle lettere in essa presenti (si consiglia di usare un array con 26 posizioni, una per ogni lettera dell'alfabeto, inizializzato tutto a zeri scorrere la stringa e incrementare il contatore della lettera corrispondente).</a:t>
+            </a:r>
+            <a:endParaRPr lang="it-IT" dirty="0">
+              <a:latin typeface="Courier New" panose="02070309020205020404" pitchFamily="49" charset="0"/>
+              <a:cs typeface="Courier New" panose="02070309020205020404" pitchFamily="49" charset="0"/>
+            </a:endParaRPr>
+          </a:p>
+        </p:txBody>
+      </p:sp>
+      <p:sp>
+        <p:nvSpPr>
+          <p:cNvPr id="9" name="Title 2"/>
+          <p:cNvSpPr>
+            <a:spLocks noGrp="1"/>
+          </p:cNvSpPr>
+          <p:nvPr>
+            <p:ph type="title"/>
+          </p:nvPr>
+        </p:nvSpPr>
+        <p:spPr/>
+        <p:txBody>
+          <a:bodyPr/>
+          <a:lstStyle/>
+          <a:p>
+            <a:r>
+              <a:rPr lang="it-IT" dirty="0"/>
+              <a:t>Esercizi</a:t>
+            </a:r>
+            <a:endParaRPr lang="it-IT" sz="2800" dirty="0">
+              <a:effectLst/>
+            </a:endParaRPr>
+          </a:p>
+        </p:txBody>
+      </p:sp>
+      <p:sp>
+        <p:nvSpPr>
+          <p:cNvPr id="6" name="Slide Number Placeholder 4"/>
+          <p:cNvSpPr>
+            <a:spLocks noGrp="1"/>
+          </p:cNvSpPr>
+          <p:nvPr>
+            <p:ph type="sldNum" sz="quarter" idx="12"/>
+          </p:nvPr>
+        </p:nvSpPr>
+        <p:spPr>
+          <a:xfrm>
+            <a:off x="9027918" y="6590846"/>
+            <a:ext cx="855983" cy="143633"/>
+          </a:xfrm>
+        </p:spPr>
+        <p:txBody>
+          <a:bodyPr/>
+          <a:lstStyle/>
+          <a:p>
+            <a:fld id="{FB20157B-BF21-4976-810E-1ABA2FD4E36F}" type="slidenum">
+              <a:rPr lang="it-IT" smtClean="0"/>
+              <a:pPr/>
+              <a:t>12</a:t>
             </a:fld>
             <a:endParaRPr lang="it-IT"/>
           </a:p>
@@ -2769,6 +2993,222 @@
               <a:rPr lang="it-IT" smtClean="0"/>
               <a:pPr/>
               <a:t>2</a:t>
+            </a:fld>
+            <a:endParaRPr lang="it-IT"/>
+          </a:p>
+        </p:txBody>
+      </p:sp>
+      <p:sp>
+        <p:nvSpPr>
+          <p:cNvPr id="6" name="Title 5"/>
+          <p:cNvSpPr>
+            <a:spLocks noGrp="1"/>
+          </p:cNvSpPr>
+          <p:nvPr>
+            <p:ph type="title"/>
+          </p:nvPr>
+        </p:nvSpPr>
+        <p:spPr/>
+        <p:txBody>
+          <a:bodyPr/>
+          <a:lstStyle/>
+          <a:p>
+            <a:r>
+              <a:rPr lang="it-IT" sz="3600" dirty="0">
+                <a:latin typeface="Calibri" panose="020F0502020204030204" pitchFamily="34" charset="0"/>
+              </a:rPr>
+              <a:t>Installiamo Visual Studio!</a:t>
+            </a:r>
+          </a:p>
+        </p:txBody>
+      </p:sp>
+      <p:sp>
+        <p:nvSpPr>
+          <p:cNvPr id="10" name="Content Placeholder 1"/>
+          <p:cNvSpPr>
+            <a:spLocks noGrp="1"/>
+          </p:cNvSpPr>
+          <p:nvPr>
+            <p:ph idx="1"/>
+          </p:nvPr>
+        </p:nvSpPr>
+        <p:spPr>
+          <a:xfrm>
+            <a:off x="407907" y="1260029"/>
+            <a:ext cx="10692765" cy="4514439"/>
+          </a:xfrm>
+        </p:spPr>
+        <p:txBody>
+          <a:bodyPr/>
+          <a:lstStyle/>
+          <a:p>
+            <a:r>
+              <a:rPr lang="it-IT" b="1" dirty="0">
+                <a:solidFill>
+                  <a:srgbClr val="C00000"/>
+                </a:solidFill>
+              </a:rPr>
+              <a:t>Link per il download</a:t>
+            </a:r>
+            <a:endParaRPr lang="it-IT" dirty="0">
+              <a:solidFill>
+                <a:srgbClr val="C00000"/>
+              </a:solidFill>
+            </a:endParaRPr>
+          </a:p>
+          <a:p>
+            <a:pPr lvl="1"/>
+            <a:r>
+              <a:rPr lang="it-IT" sz="1400" b="1" dirty="0"/>
+              <a:t>Dal sito di Microsoft</a:t>
+            </a:r>
+            <a:r>
+              <a:rPr lang="it-IT" sz="1400" dirty="0"/>
+              <a:t>:</a:t>
+            </a:r>
+          </a:p>
+          <a:p>
+            <a:pPr marL="601150" lvl="1" indent="0" algn="ctr">
+              <a:buNone/>
+            </a:pPr>
+            <a:r>
+              <a:rPr lang="it-IT" sz="2000" dirty="0">
+                <a:latin typeface="Calibri" panose="020F0502020204030204" pitchFamily="34" charset="0"/>
+                <a:ea typeface="Calibri" panose="020F0502020204030204" pitchFamily="34" charset="0"/>
+                <a:cs typeface="Times New Roman" panose="02020603050405020304" pitchFamily="18" charset="0"/>
+              </a:rPr>
+              <a:t>https://go.microsoft.com/fwlink/?LinkId=691978&amp;clcid=0x410</a:t>
+            </a:r>
+            <a:endParaRPr lang="it-IT" sz="2000" dirty="0"/>
+          </a:p>
+          <a:p>
+            <a:pPr lvl="1"/>
+            <a:r>
+              <a:rPr lang="it-IT" sz="1400" b="1" dirty="0"/>
+              <a:t>Url corto:</a:t>
+            </a:r>
+            <a:endParaRPr lang="it-IT" sz="1400" dirty="0"/>
+          </a:p>
+          <a:p>
+            <a:pPr marL="601150" lvl="1" indent="0" algn="ctr">
+              <a:buNone/>
+            </a:pPr>
+            <a:r>
+              <a:rPr lang="it-IT" sz="2000" b="1" dirty="0">
+                <a:solidFill>
+                  <a:srgbClr val="C00000"/>
+                </a:solidFill>
+              </a:rPr>
+              <a:t>http://bit.do/vs-its</a:t>
+            </a:r>
+            <a:endParaRPr lang="it-IT" sz="2400" b="1" dirty="0">
+              <a:solidFill>
+                <a:srgbClr val="C00000"/>
+              </a:solidFill>
+            </a:endParaRPr>
+          </a:p>
+          <a:p>
+            <a:pPr marL="601150" lvl="1" indent="0">
+              <a:buNone/>
+            </a:pPr>
+            <a:endParaRPr lang="it-IT" sz="1400" dirty="0"/>
+          </a:p>
+          <a:p>
+            <a:r>
+              <a:rPr lang="it-IT" b="1" dirty="0">
+                <a:solidFill>
+                  <a:srgbClr val="C00000"/>
+                </a:solidFill>
+              </a:rPr>
+              <a:t>QR Code</a:t>
+            </a:r>
+            <a:endParaRPr lang="it-IT" dirty="0">
+              <a:solidFill>
+                <a:srgbClr val="C00000"/>
+              </a:solidFill>
+            </a:endParaRPr>
+          </a:p>
+        </p:txBody>
+      </p:sp>
+      <p:pic>
+        <p:nvPicPr>
+          <p:cNvPr id="7" name="Picture 6"/>
+          <p:cNvPicPr>
+            <a:picLocks noChangeAspect="1"/>
+          </p:cNvPicPr>
+          <p:nvPr/>
+        </p:nvPicPr>
+        <p:blipFill>
+          <a:blip r:embed="rId2" cstate="print">
+            <a:extLst>
+              <a:ext uri="{28A0092B-C50C-407E-A947-70E740481C1C}">
+                <a14:useLocalDpi xmlns:a14="http://schemas.microsoft.com/office/drawing/2010/main" val="0"/>
+              </a:ext>
+            </a:extLst>
+          </a:blip>
+          <a:stretch>
+            <a:fillRect/>
+          </a:stretch>
+        </p:blipFill>
+        <p:spPr>
+          <a:xfrm>
+            <a:off x="4572273" y="3451442"/>
+            <a:ext cx="3019481" cy="3019481"/>
+          </a:xfrm>
+          <a:prstGeom prst="rect">
+            <a:avLst/>
+          </a:prstGeom>
+        </p:spPr>
+      </p:pic>
+    </p:spTree>
+    <p:extLst>
+      <p:ext uri="{BB962C8B-B14F-4D97-AF65-F5344CB8AC3E}">
+        <p14:creationId xmlns:p14="http://schemas.microsoft.com/office/powerpoint/2010/main" val="910148670"/>
+      </p:ext>
+    </p:extLst>
+  </p:cSld>
+  <p:clrMapOvr>
+    <a:masterClrMapping/>
+  </p:clrMapOvr>
+</p:sld>
+</file>
+
+<file path=ppt/slides/slide3.xml><?xml version="1.0" encoding="utf-8"?>
+<p:sld xmlns:a="http://schemas.openxmlformats.org/drawingml/2006/main" xmlns:r="http://schemas.openxmlformats.org/officeDocument/2006/relationships" xmlns:p="http://schemas.openxmlformats.org/presentationml/2006/main">
+  <p:cSld>
+    <p:spTree>
+      <p:nvGrpSpPr>
+        <p:cNvPr id="1" name=""/>
+        <p:cNvGrpSpPr/>
+        <p:nvPr/>
+      </p:nvGrpSpPr>
+      <p:grpSpPr>
+        <a:xfrm>
+          <a:off x="0" y="0"/>
+          <a:ext cx="0" cy="0"/>
+          <a:chOff x="0" y="0"/>
+          <a:chExt cx="0" cy="0"/>
+        </a:xfrm>
+      </p:grpSpPr>
+      <p:sp>
+        <p:nvSpPr>
+          <p:cNvPr id="5" name="Slide Number Placeholder 4"/>
+          <p:cNvSpPr>
+            <a:spLocks noGrp="1"/>
+          </p:cNvSpPr>
+          <p:nvPr>
+            <p:ph type="sldNum" sz="quarter" idx="12"/>
+          </p:nvPr>
+        </p:nvSpPr>
+        <p:spPr/>
+        <p:txBody>
+          <a:bodyPr/>
+          <a:lstStyle/>
+          <a:p>
+            <a:fld id="{FB20157B-BF21-4976-810E-1ABA2FD4E36F}" type="slidenum">
+              <a:rPr lang="it-IT" smtClean="0"/>
+              <a:pPr/>
+              <a:t>3</a:t>
             </a:fld>
             <a:endParaRPr lang="it-IT"/>
           </a:p>
@@ -2853,7 +3293,7 @@
 </p:sld>
 </file>
 
-<file path=ppt/slides/slide3.xml><?xml version="1.0" encoding="utf-8"?>
+<file path=ppt/slides/slide4.xml><?xml version="1.0" encoding="utf-8"?>
 <p:sld xmlns:a="http://schemas.openxmlformats.org/drawingml/2006/main" xmlns:r="http://schemas.openxmlformats.org/officeDocument/2006/relationships" xmlns:p="http://schemas.openxmlformats.org/presentationml/2006/main">
   <p:cSld>
     <p:spTree>
@@ -2888,7 +3328,7 @@
             <a:fld id="{FB20157B-BF21-4976-810E-1ABA2FD4E36F}" type="slidenum">
               <a:rPr lang="it-IT" smtClean="0"/>
               <a:pPr/>
-              <a:t>3</a:t>
+              <a:t>4</a:t>
             </a:fld>
             <a:endParaRPr lang="it-IT"/>
           </a:p>
@@ -2956,7 +3396,7 @@
 </p:sld>
 </file>
 
-<file path=ppt/slides/slide4.xml><?xml version="1.0" encoding="utf-8"?>
+<file path=ppt/slides/slide5.xml><?xml version="1.0" encoding="utf-8"?>
 <p:sld xmlns:a="http://schemas.openxmlformats.org/drawingml/2006/main" xmlns:r="http://schemas.openxmlformats.org/officeDocument/2006/relationships" xmlns:p="http://schemas.openxmlformats.org/presentationml/2006/main">
   <p:cSld>
     <p:spTree>
@@ -3124,7 +3564,7 @@
             <a:fld id="{FB20157B-BF21-4976-810E-1ABA2FD4E36F}" type="slidenum">
               <a:rPr lang="it-IT" smtClean="0"/>
               <a:pPr/>
-              <a:t>4</a:t>
+              <a:t>5</a:t>
             </a:fld>
             <a:endParaRPr lang="it-IT"/>
           </a:p>
@@ -3303,7 +3743,7 @@
 </p:sld>
 </file>
 
-<file path=ppt/slides/slide5.xml><?xml version="1.0" encoding="utf-8"?>
+<file path=ppt/slides/slide6.xml><?xml version="1.0" encoding="utf-8"?>
 <p:sld xmlns:a="http://schemas.openxmlformats.org/drawingml/2006/main" xmlns:r="http://schemas.openxmlformats.org/officeDocument/2006/relationships" xmlns:p="http://schemas.openxmlformats.org/presentationml/2006/main">
   <p:cSld>
     <p:spTree>
@@ -3467,7 +3907,7 @@
             <a:fld id="{FB20157B-BF21-4976-810E-1ABA2FD4E36F}" type="slidenum">
               <a:rPr lang="it-IT" smtClean="0"/>
               <a:pPr/>
-              <a:t>5</a:t>
+              <a:t>6</a:t>
             </a:fld>
             <a:endParaRPr lang="it-IT"/>
           </a:p>
@@ -3510,7 +3950,7 @@
 </p:sld>
 </file>
 
-<file path=ppt/slides/slide6.xml><?xml version="1.0" encoding="utf-8"?>
+<file path=ppt/slides/slide7.xml><?xml version="1.0" encoding="utf-8"?>
 <p:sld xmlns:a="http://schemas.openxmlformats.org/drawingml/2006/main" xmlns:r="http://schemas.openxmlformats.org/officeDocument/2006/relationships" xmlns:p="http://schemas.openxmlformats.org/presentationml/2006/main">
   <p:cSld>
     <p:spTree>
@@ -3681,7 +4121,7 @@
             <a:fld id="{FB20157B-BF21-4976-810E-1ABA2FD4E36F}" type="slidenum">
               <a:rPr lang="it-IT" smtClean="0"/>
               <a:pPr/>
-              <a:t>6</a:t>
+              <a:t>7</a:t>
             </a:fld>
             <a:endParaRPr lang="it-IT"/>
           </a:p>
@@ -3765,7 +4205,7 @@
 </p:sld>
 </file>
 
-<file path=ppt/slides/slide7.xml><?xml version="1.0" encoding="utf-8"?>
+<file path=ppt/slides/slide8.xml><?xml version="1.0" encoding="utf-8"?>
 <p:sld xmlns:a="http://schemas.openxmlformats.org/drawingml/2006/main" xmlns:r="http://schemas.openxmlformats.org/officeDocument/2006/relationships" xmlns:p="http://schemas.openxmlformats.org/presentationml/2006/main">
   <p:cSld>
     <p:spTree>
@@ -3983,7 +4423,7 @@
             <a:fld id="{FB20157B-BF21-4976-810E-1ABA2FD4E36F}" type="slidenum">
               <a:rPr lang="it-IT" smtClean="0"/>
               <a:pPr/>
-              <a:t>7</a:t>
+              <a:t>8</a:t>
             </a:fld>
             <a:endParaRPr lang="it-IT"/>
           </a:p>
@@ -4002,7 +4442,7 @@
 </p:sld>
 </file>
 
-<file path=ppt/slides/slide8.xml><?xml version="1.0" encoding="utf-8"?>
+<file path=ppt/slides/slide9.xml><?xml version="1.0" encoding="utf-8"?>
 <p:sld xmlns:a="http://schemas.openxmlformats.org/drawingml/2006/main" xmlns:r="http://schemas.openxmlformats.org/officeDocument/2006/relationships" xmlns:p="http://schemas.openxmlformats.org/presentationml/2006/main">
   <p:cSld>
     <p:spTree>
@@ -4067,7 +4507,7 @@
             <a:fld id="{FB20157B-BF21-4976-810E-1ABA2FD4E36F}" type="slidenum">
               <a:rPr lang="it-IT" smtClean="0"/>
               <a:pPr/>
-              <a:t>8</a:t>
+              <a:t>9</a:t>
             </a:fld>
             <a:endParaRPr lang="it-IT"/>
           </a:p>
@@ -4118,237 +4558,6 @@
     <p:extLst>
       <p:ext uri="{BB962C8B-B14F-4D97-AF65-F5344CB8AC3E}">
         <p14:creationId xmlns:p14="http://schemas.microsoft.com/office/powerpoint/2010/main" val="3193027289"/>
-      </p:ext>
-    </p:extLst>
-  </p:cSld>
-  <p:clrMapOvr>
-    <a:masterClrMapping/>
-  </p:clrMapOvr>
-</p:sld>
-</file>
-
-<file path=ppt/slides/slide9.xml><?xml version="1.0" encoding="utf-8"?>
-<p:sld xmlns:a="http://schemas.openxmlformats.org/drawingml/2006/main" xmlns:r="http://schemas.openxmlformats.org/officeDocument/2006/relationships" xmlns:p="http://schemas.openxmlformats.org/presentationml/2006/main">
-  <p:cSld>
-    <p:spTree>
-      <p:nvGrpSpPr>
-        <p:cNvPr id="1" name=""/>
-        <p:cNvGrpSpPr/>
-        <p:nvPr/>
-      </p:nvGrpSpPr>
-      <p:grpSpPr>
-        <a:xfrm>
-          <a:off x="0" y="0"/>
-          <a:ext cx="0" cy="0"/>
-          <a:chOff x="0" y="0"/>
-          <a:chExt cx="0" cy="0"/>
-        </a:xfrm>
-      </p:grpSpPr>
-      <p:sp>
-        <p:nvSpPr>
-          <p:cNvPr id="2" name="Content Placeholder 1"/>
-          <p:cNvSpPr>
-            <a:spLocks noGrp="1"/>
-          </p:cNvSpPr>
-          <p:nvPr>
-            <p:ph idx="1"/>
-          </p:nvPr>
-        </p:nvSpPr>
-        <p:spPr/>
-        <p:txBody>
-          <a:bodyPr/>
-          <a:lstStyle/>
-          <a:p>
-            <a:pPr marL="0" indent="0">
-              <a:buNone/>
-            </a:pPr>
-            <a:r>
-              <a:rPr lang="it-IT" dirty="0"/>
-              <a:t>Ogni programma in C#:</a:t>
-            </a:r>
-          </a:p>
-          <a:p>
-            <a:r>
-              <a:rPr lang="it-IT" dirty="0"/>
-              <a:t>consiste di </a:t>
-            </a:r>
-            <a:r>
-              <a:rPr lang="it-IT" b="1" dirty="0">
-                <a:solidFill>
-                  <a:srgbClr val="C00000"/>
-                </a:solidFill>
-              </a:rPr>
-              <a:t>uno o più file .cs</a:t>
-            </a:r>
-            <a:endParaRPr lang="it-IT" dirty="0"/>
-          </a:p>
-          <a:p>
-            <a:r>
-              <a:rPr lang="it-IT" dirty="0"/>
-              <a:t>deve contenere una </a:t>
-            </a:r>
-            <a:r>
-              <a:rPr lang="it-IT" b="1" dirty="0">
-                <a:solidFill>
-                  <a:srgbClr val="C00000"/>
-                </a:solidFill>
-              </a:rPr>
-              <a:t>funzione main specifica</a:t>
-            </a:r>
-            <a:r>
-              <a:rPr lang="it-IT" dirty="0"/>
-              <a:t>, di questo formato:</a:t>
-            </a:r>
-            <a:br>
-              <a:rPr lang="it-IT" dirty="0"/>
-            </a:br>
-            <a:br>
-              <a:rPr lang="it-IT" sz="1000" dirty="0"/>
-            </a:br>
-            <a:r>
-              <a:rPr lang="it-IT" dirty="0">
-                <a:latin typeface="Courier New" panose="02070309020205020404" pitchFamily="49" charset="0"/>
-                <a:cs typeface="Courier New" panose="02070309020205020404" pitchFamily="49" charset="0"/>
-              </a:rPr>
-              <a:t>static void Main(string[] args)</a:t>
-            </a:r>
-            <a:r>
-              <a:rPr lang="it-IT" dirty="0">
-                <a:latin typeface="Courier New" panose="02070309020205020404" pitchFamily="49" charset="0"/>
-                <a:cs typeface="Courier New" panose="02070309020205020404" pitchFamily="49" charset="0"/>
-              </a:rPr>
-              <a:t> { ... }</a:t>
-            </a:r>
-          </a:p>
-          <a:p>
-            <a:endParaRPr lang="it-IT" dirty="0">
-              <a:latin typeface="Courier New" panose="02070309020205020404" pitchFamily="49" charset="0"/>
-              <a:cs typeface="Courier New" panose="02070309020205020404" pitchFamily="49" charset="0"/>
-            </a:endParaRPr>
-          </a:p>
-          <a:p>
-            <a:pPr marL="0" indent="0">
-              <a:buNone/>
-            </a:pPr>
-            <a:r>
-              <a:rPr lang="it-IT" dirty="0"/>
-              <a:t>La sintassi del linguaggio C# consiste di (</a:t>
-            </a:r>
-            <a:r>
-              <a:rPr lang="it-IT" u="sng" dirty="0">
-                <a:hlinkClick r:id="rId2"/>
-              </a:rPr>
-              <a:t>https://msdn.microsoft.com/it-it/library/z1zx9t92.aspx</a:t>
-            </a:r>
-            <a:r>
-              <a:rPr lang="it-IT" dirty="0"/>
-              <a:t>):</a:t>
-            </a:r>
-          </a:p>
-          <a:p>
-            <a:r>
-              <a:rPr lang="it-IT" dirty="0"/>
-              <a:t>struttura generale del programma (funzioni, variabili, costanti, operazioni)</a:t>
-            </a:r>
-          </a:p>
-          <a:p>
-            <a:r>
-              <a:rPr lang="it-IT" dirty="0"/>
-              <a:t>strutture di controllo (if, for, while, switch)</a:t>
-            </a:r>
-          </a:p>
-          <a:p>
-            <a:endParaRPr lang="it-IT" i="1" dirty="0">
-              <a:solidFill>
-                <a:srgbClr val="C00000"/>
-              </a:solidFill>
-            </a:endParaRPr>
-          </a:p>
-          <a:p>
-            <a:r>
-              <a:rPr lang="it-IT" i="1" dirty="0"/>
-              <a:t>classi e </a:t>
-            </a:r>
-            <a:r>
-              <a:rPr lang="it-IT" b="1" i="1" dirty="0">
-                <a:solidFill>
-                  <a:srgbClr val="C00000"/>
-                </a:solidFill>
-              </a:rPr>
-              <a:t>oggetti</a:t>
-            </a:r>
-            <a:endParaRPr lang="it-IT" i="1" dirty="0">
-              <a:solidFill>
-                <a:srgbClr val="C00000"/>
-              </a:solidFill>
-            </a:endParaRPr>
-          </a:p>
-          <a:p>
-            <a:endParaRPr lang="it-IT" dirty="0">
-              <a:latin typeface="Courier New" panose="02070309020205020404" pitchFamily="49" charset="0"/>
-              <a:cs typeface="Courier New" panose="02070309020205020404" pitchFamily="49" charset="0"/>
-            </a:endParaRPr>
-          </a:p>
-        </p:txBody>
-      </p:sp>
-      <p:sp>
-        <p:nvSpPr>
-          <p:cNvPr id="9" name="Title 2"/>
-          <p:cNvSpPr>
-            <a:spLocks noGrp="1"/>
-          </p:cNvSpPr>
-          <p:nvPr>
-            <p:ph type="title"/>
-          </p:nvPr>
-        </p:nvSpPr>
-        <p:spPr/>
-        <p:txBody>
-          <a:bodyPr/>
-          <a:lstStyle/>
-          <a:p>
-            <a:r>
-              <a:rPr lang="it-IT" dirty="0"/>
-              <a:t>Come è fatto un programma C#</a:t>
-            </a:r>
-            <a:endParaRPr lang="it-IT" sz="2800" dirty="0">
-              <a:effectLst/>
-            </a:endParaRPr>
-          </a:p>
-        </p:txBody>
-      </p:sp>
-      <p:sp>
-        <p:nvSpPr>
-          <p:cNvPr id="6" name="Slide Number Placeholder 4"/>
-          <p:cNvSpPr>
-            <a:spLocks noGrp="1"/>
-          </p:cNvSpPr>
-          <p:nvPr>
-            <p:ph type="sldNum" sz="quarter" idx="12"/>
-          </p:nvPr>
-        </p:nvSpPr>
-        <p:spPr>
-          <a:xfrm>
-            <a:off x="9027918" y="6590846"/>
-            <a:ext cx="855983" cy="143633"/>
-          </a:xfrm>
-        </p:spPr>
-        <p:txBody>
-          <a:bodyPr/>
-          <a:lstStyle/>
-          <a:p>
-            <a:fld id="{FB20157B-BF21-4976-810E-1ABA2FD4E36F}" type="slidenum">
-              <a:rPr lang="it-IT" smtClean="0"/>
-              <a:pPr/>
-              <a:t>9</a:t>
-            </a:fld>
-            <a:endParaRPr lang="it-IT"/>
-          </a:p>
-        </p:txBody>
-      </p:sp>
-    </p:spTree>
-    <p:extLst>
-      <p:ext uri="{BB962C8B-B14F-4D97-AF65-F5344CB8AC3E}">
-        <p14:creationId xmlns:p14="http://schemas.microsoft.com/office/powerpoint/2010/main" val="715918362"/>
       </p:ext>
     </p:extLst>
   </p:cSld>
@@ -5496,12 +5705,9 @@
 </file>
 
 <file path=customXml/item1.xml><?xml version="1.0" encoding="utf-8"?>
-<?mso-contentType ?>
-<FormTemplates xmlns="http://schemas.microsoft.com/sharepoint/v3/contenttype/forms">
-  <Display>DocumentLibraryForm</Display>
-  <Edit>DocumentLibraryForm</Edit>
-  <New>DocumentLibraryForm</New>
-</FormTemplates>
+<p:properties xmlns:p="http://schemas.microsoft.com/office/2006/metadata/properties" xmlns:xsi="http://www.w3.org/2001/XMLSchema-instance" xmlns:pc="http://schemas.microsoft.com/office/infopath/2007/PartnerControls">
+  <documentManagement/>
+</p:properties>
 </file>
 
 <file path=customXml/item2.xml><?xml version="1.0" encoding="utf-8"?>
@@ -5619,15 +5825,25 @@
 </file>
 
 <file path=customXml/item3.xml><?xml version="1.0" encoding="utf-8"?>
-<p:properties xmlns:p="http://schemas.microsoft.com/office/2006/metadata/properties" xmlns:xsi="http://www.w3.org/2001/XMLSchema-instance" xmlns:pc="http://schemas.microsoft.com/office/infopath/2007/PartnerControls">
-  <documentManagement/>
-</p:properties>
+<?mso-contentType ?>
+<FormTemplates xmlns="http://schemas.microsoft.com/sharepoint/v3/contenttype/forms">
+  <Display>DocumentLibraryForm</Display>
+  <Edit>DocumentLibraryForm</Edit>
+  <New>DocumentLibraryForm</New>
+</FormTemplates>
 </file>
 
 <file path=customXml/itemProps1.xml><?xml version="1.0" encoding="utf-8"?>
-<ds:datastoreItem xmlns:ds="http://schemas.openxmlformats.org/officeDocument/2006/customXml" ds:itemID="{6284E3BA-FE6E-4F67-9072-1F25BCD921CF}">
+<ds:datastoreItem xmlns:ds="http://schemas.openxmlformats.org/officeDocument/2006/customXml" ds:itemID="{EEAC1E32-0142-4827-B761-C86BDAF25AFB}">
   <ds:schemaRefs>
-    <ds:schemaRef ds:uri="http://schemas.microsoft.com/sharepoint/v3/contenttype/forms"/>
+    <ds:schemaRef ds:uri="http://schemas.microsoft.com/office/2006/documentManagement/types"/>
+    <ds:schemaRef ds:uri="http://www.w3.org/XML/1998/namespace"/>
+    <ds:schemaRef ds:uri="http://purl.org/dc/terms/"/>
+    <ds:schemaRef ds:uri="http://purl.org/dc/elements/1.1/"/>
+    <ds:schemaRef ds:uri="http://purl.org/dc/dcmitype/"/>
+    <ds:schemaRef ds:uri="http://schemas.microsoft.com/office/infopath/2007/PartnerControls"/>
+    <ds:schemaRef ds:uri="http://schemas.openxmlformats.org/package/2006/metadata/core-properties"/>
+    <ds:schemaRef ds:uri="http://schemas.microsoft.com/office/2006/metadata/properties"/>
   </ds:schemaRefs>
 </ds:datastoreItem>
 </file>
@@ -5649,16 +5865,9 @@
 </file>
 
 <file path=customXml/itemProps3.xml><?xml version="1.0" encoding="utf-8"?>
-<ds:datastoreItem xmlns:ds="http://schemas.openxmlformats.org/officeDocument/2006/customXml" ds:itemID="{EEAC1E32-0142-4827-B761-C86BDAF25AFB}">
+<ds:datastoreItem xmlns:ds="http://schemas.openxmlformats.org/officeDocument/2006/customXml" ds:itemID="{6284E3BA-FE6E-4F67-9072-1F25BCD921CF}">
   <ds:schemaRefs>
-    <ds:schemaRef ds:uri="http://schemas.microsoft.com/office/2006/documentManagement/types"/>
-    <ds:schemaRef ds:uri="http://www.w3.org/XML/1998/namespace"/>
-    <ds:schemaRef ds:uri="http://purl.org/dc/terms/"/>
-    <ds:schemaRef ds:uri="http://purl.org/dc/elements/1.1/"/>
-    <ds:schemaRef ds:uri="http://purl.org/dc/dcmitype/"/>
-    <ds:schemaRef ds:uri="http://schemas.microsoft.com/office/infopath/2007/PartnerControls"/>
-    <ds:schemaRef ds:uri="http://schemas.openxmlformats.org/package/2006/metadata/core-properties"/>
-    <ds:schemaRef ds:uri="http://schemas.microsoft.com/office/2006/metadata/properties"/>
+    <ds:schemaRef ds:uri="http://schemas.microsoft.com/sharepoint/v3/contenttype/forms"/>
   </ds:schemaRefs>
 </ds:datastoreItem>
 </file>
</xml_diff>

<commit_message>
Added examples for different programming languages
</commit_message>
<xml_diff>
--- a/Sviluppo Software.pptx
+++ b/Sviluppo Software.pptx
@@ -5,10 +5,10 @@
     <p:sldMasterId id="2147483651" r:id="rId4"/>
   </p:sldMasterIdLst>
   <p:notesMasterIdLst>
-    <p:notesMasterId r:id="rId18"/>
+    <p:notesMasterId r:id="rId21"/>
   </p:notesMasterIdLst>
   <p:handoutMasterIdLst>
-    <p:handoutMasterId r:id="rId19"/>
+    <p:handoutMasterId r:id="rId22"/>
   </p:handoutMasterIdLst>
   <p:sldIdLst>
     <p:sldId id="293" r:id="rId5"/>
@@ -16,14 +16,17 @@
     <p:sldId id="528" r:id="rId7"/>
     <p:sldId id="530" r:id="rId8"/>
     <p:sldId id="529" r:id="rId9"/>
-    <p:sldId id="532" r:id="rId10"/>
-    <p:sldId id="531" r:id="rId11"/>
-    <p:sldId id="533" r:id="rId12"/>
-    <p:sldId id="539" r:id="rId13"/>
-    <p:sldId id="534" r:id="rId14"/>
-    <p:sldId id="537" r:id="rId15"/>
-    <p:sldId id="538" r:id="rId16"/>
-    <p:sldId id="541" r:id="rId17"/>
+    <p:sldId id="544" r:id="rId10"/>
+    <p:sldId id="542" r:id="rId11"/>
+    <p:sldId id="543" r:id="rId12"/>
+    <p:sldId id="532" r:id="rId13"/>
+    <p:sldId id="531" r:id="rId14"/>
+    <p:sldId id="533" r:id="rId15"/>
+    <p:sldId id="539" r:id="rId16"/>
+    <p:sldId id="534" r:id="rId17"/>
+    <p:sldId id="537" r:id="rId18"/>
+    <p:sldId id="538" r:id="rId19"/>
+    <p:sldId id="541" r:id="rId20"/>
   </p:sldIdLst>
   <p:sldSz cx="11880850" cy="6840538"/>
   <p:notesSz cx="6797675" cy="9926638"/>
@@ -180,7 +183,28 @@
       </p:ext>
     </p:extLst>
   </p:cmAuthor>
+  <p:cmAuthor id="2" name="Biancini Andrea" initials="BA" lastIdx="1" clrIdx="1">
+    <p:extLst>
+      <p:ext uri="{19B8F6BF-5375-455C-9EA6-DF929625EA0E}">
+        <p15:presenceInfo xmlns:p15="http://schemas.microsoft.com/office/powerpoint/2012/main" userId="S-1-5-21-1390067357-1957994488-1060284298-1131" providerId="AD"/>
+      </p:ext>
+    </p:extLst>
+  </p:cmAuthor>
 </p:cmAuthorLst>
+</file>
+
+<file path=ppt/comments/comment1.xml><?xml version="1.0" encoding="utf-8"?>
+<p:cmLst xmlns:a="http://schemas.openxmlformats.org/drawingml/2006/main" xmlns:r="http://schemas.openxmlformats.org/officeDocument/2006/relationships" xmlns:p="http://schemas.openxmlformats.org/presentationml/2006/main">
+  <p:cm authorId="2" dt="2016-12-09T07:45:58.062" idx="1">
+    <p:pos x="10" y="10"/>
+    <p:text/>
+    <p:extLst>
+      <p:ext uri="{C676402C-5697-4E1C-873F-D02D1690AC5C}">
+        <p15:threadingInfo xmlns:p15="http://schemas.microsoft.com/office/powerpoint/2012/main" timeZoneBias="-60"/>
+      </p:ext>
+    </p:extLst>
+  </p:cm>
+</p:cmLst>
 </file>
 
 <file path=ppt/handoutMasters/handoutMaster1.xml><?xml version="1.0" encoding="utf-8"?>
@@ -265,7 +289,7 @@
           <a:p>
             <a:fld id="{F3ECCCF9-49CE-42F6-A23A-8E4AC2EFFAFE}" type="datetimeFigureOut">
               <a:rPr lang="it-IT" smtClean="0"/>
-              <a:t>08/12/2016</a:t>
+              <a:t>09/12/2016</a:t>
             </a:fld>
             <a:endParaRPr lang="it-IT"/>
           </a:p>
@@ -1236,7 +1260,7 @@
             <a:fld id="{B4BDCE43-8D42-4382-A0DD-849D3C6434DB}" type="datetime1">
               <a:rPr lang="it-IT" smtClean="0"/>
               <a:pPr/>
-              <a:t>08/12/2016</a:t>
+              <a:t>09/12/2016</a:t>
             </a:fld>
             <a:endParaRPr lang="it-IT" dirty="0"/>
           </a:p>
@@ -1473,7 +1497,7 @@
           <a:p>
             <a:fld id="{C8C33378-5A52-4351-907E-04F015C42420}" type="datetime1">
               <a:rPr lang="it-IT" smtClean="0"/>
-              <a:t>08/12/2016</a:t>
+              <a:t>09/12/2016</a:t>
             </a:fld>
             <a:endParaRPr lang="it-IT" dirty="0"/>
           </a:p>
@@ -2341,139 +2365,159 @@
             <p:ph idx="1"/>
           </p:nvPr>
         </p:nvSpPr>
+        <p:spPr>
+          <a:xfrm>
+            <a:off x="5796409" y="1476053"/>
+            <a:ext cx="5490399" cy="3960440"/>
+          </a:xfrm>
+        </p:spPr>
+        <p:txBody>
+          <a:bodyPr/>
+          <a:lstStyle/>
+          <a:p>
+            <a:r>
+              <a:rPr lang="it-IT" dirty="0"/>
+              <a:t>La trasformazione dei sorgenti in un programma eseguibile avviene in due fasi: </a:t>
+            </a:r>
+          </a:p>
+          <a:p>
+            <a:pPr lvl="1"/>
+            <a:r>
+              <a:rPr lang="it-IT" sz="1400" b="1" dirty="0">
+                <a:solidFill>
+                  <a:srgbClr val="C00000"/>
+                </a:solidFill>
+              </a:rPr>
+              <a:t>compilazione</a:t>
+            </a:r>
+            <a:r>
+              <a:rPr lang="it-IT" sz="1400" dirty="0"/>
+              <a:t>, e</a:t>
+            </a:r>
+          </a:p>
+          <a:p>
+            <a:pPr lvl="1"/>
+            <a:r>
+              <a:rPr lang="it-IT" sz="1400" b="1" dirty="0">
+                <a:solidFill>
+                  <a:srgbClr val="C00000"/>
+                </a:solidFill>
+              </a:rPr>
+              <a:t>linking</a:t>
+            </a:r>
+            <a:br>
+              <a:rPr lang="it-IT" dirty="0"/>
+            </a:br>
+            <a:endParaRPr lang="it-IT" dirty="0"/>
+          </a:p>
+          <a:p>
+            <a:r>
+              <a:rPr lang="it-IT" dirty="0"/>
+              <a:t>Nel linking possono essere "collegate" </a:t>
+            </a:r>
+            <a:r>
+              <a:rPr lang="it-IT" b="1" dirty="0">
+                <a:solidFill>
+                  <a:srgbClr val="C00000"/>
+                </a:solidFill>
+              </a:rPr>
+              <a:t>librerie</a:t>
+            </a:r>
+            <a:r>
+              <a:rPr lang="it-IT" dirty="0">
+                <a:solidFill>
+                  <a:srgbClr val="C00000"/>
+                </a:solidFill>
+              </a:rPr>
+              <a:t> </a:t>
+            </a:r>
+            <a:r>
+              <a:rPr lang="it-IT" b="1" dirty="0">
+                <a:solidFill>
+                  <a:srgbClr val="C00000"/>
+                </a:solidFill>
+              </a:rPr>
+              <a:t>esterne</a:t>
+            </a:r>
+            <a:r>
+              <a:rPr lang="it-IT" dirty="0"/>
+              <a:t> che vengono incluse nell'eseguibile prodotto.</a:t>
+            </a:r>
+            <a:br>
+              <a:rPr lang="it-IT" dirty="0"/>
+            </a:br>
+            <a:endParaRPr lang="it-IT" dirty="0"/>
+          </a:p>
+          <a:p>
+            <a:r>
+              <a:rPr lang="it-IT" dirty="0"/>
+              <a:t>Il risultato della compilazione è un eseguibile scritto in </a:t>
+            </a:r>
+            <a:r>
+              <a:rPr lang="it-IT" b="1" dirty="0">
+                <a:solidFill>
+                  <a:srgbClr val="C00000"/>
+                </a:solidFill>
+              </a:rPr>
+              <a:t>codice macchina</a:t>
+            </a:r>
+            <a:r>
+              <a:rPr lang="it-IT" dirty="0">
+                <a:solidFill>
+                  <a:srgbClr val="C00000"/>
+                </a:solidFill>
+              </a:rPr>
+              <a:t> </a:t>
+            </a:r>
+            <a:r>
+              <a:rPr lang="it-IT" dirty="0"/>
+              <a:t>(il programma può essere eseguito solo sul processore e il sistema operativo per cui è stato compilato).</a:t>
+            </a:r>
+          </a:p>
+          <a:p>
+            <a:pPr lvl="1"/>
+            <a:r>
+              <a:rPr lang="it-IT" sz="1400" dirty="0"/>
+              <a:t>è comunque possibile fare </a:t>
+            </a:r>
+            <a:r>
+              <a:rPr lang="it-IT" sz="1400" i="1" dirty="0"/>
+              <a:t>cross compilation </a:t>
+            </a:r>
+            <a:r>
+              <a:rPr lang="it-IT" sz="1400" dirty="0"/>
+              <a:t>(cioè compilare per architetture differenti!)</a:t>
+            </a:r>
+          </a:p>
+        </p:txBody>
+      </p:sp>
+      <p:sp>
+        <p:nvSpPr>
+          <p:cNvPr id="5" name="Slide Number Placeholder 4"/>
+          <p:cNvSpPr>
+            <a:spLocks noGrp="1"/>
+          </p:cNvSpPr>
+          <p:nvPr>
+            <p:ph type="sldNum" sz="quarter" idx="12"/>
+          </p:nvPr>
+        </p:nvSpPr>
         <p:spPr/>
         <p:txBody>
           <a:bodyPr/>
           <a:lstStyle/>
           <a:p>
-            <a:pPr marL="0" indent="0">
-              <a:buNone/>
-            </a:pPr>
-            <a:r>
-              <a:rPr lang="it-IT" dirty="0"/>
-              <a:t>Ogni programma in C#:</a:t>
-            </a:r>
-          </a:p>
-          <a:p>
-            <a:r>
-              <a:rPr lang="it-IT" dirty="0"/>
-              <a:t>consiste di </a:t>
-            </a:r>
-            <a:r>
-              <a:rPr lang="it-IT" b="1" dirty="0">
-                <a:solidFill>
-                  <a:srgbClr val="C00000"/>
-                </a:solidFill>
-              </a:rPr>
-              <a:t>uno o più file .cs</a:t>
-            </a:r>
-            <a:endParaRPr lang="it-IT" dirty="0"/>
-          </a:p>
-          <a:p>
-            <a:r>
-              <a:rPr lang="it-IT" dirty="0"/>
-              <a:t>deve contenere una </a:t>
-            </a:r>
-            <a:r>
-              <a:rPr lang="it-IT" b="1" dirty="0">
-                <a:solidFill>
-                  <a:srgbClr val="C00000"/>
-                </a:solidFill>
-              </a:rPr>
-              <a:t>funzione main specifica</a:t>
-            </a:r>
-            <a:r>
-              <a:rPr lang="it-IT" dirty="0"/>
-              <a:t>, di questo formato:</a:t>
-            </a:r>
-            <a:br>
-              <a:rPr lang="it-IT" dirty="0"/>
-            </a:br>
-            <a:br>
-              <a:rPr lang="it-IT" sz="1000" dirty="0"/>
-            </a:br>
-            <a:r>
-              <a:rPr lang="it-IT" dirty="0">
-                <a:latin typeface="Courier New" panose="02070309020205020404" pitchFamily="49" charset="0"/>
-                <a:cs typeface="Courier New" panose="02070309020205020404" pitchFamily="49" charset="0"/>
-              </a:rPr>
-              <a:t>static void Main(string[] args) { ... }</a:t>
-            </a:r>
-          </a:p>
-          <a:p>
-            <a:endParaRPr lang="it-IT" dirty="0">
-              <a:latin typeface="Courier New" panose="02070309020205020404" pitchFamily="49" charset="0"/>
-              <a:cs typeface="Courier New" panose="02070309020205020404" pitchFamily="49" charset="0"/>
-            </a:endParaRPr>
-          </a:p>
-          <a:p>
-            <a:pPr marL="0" indent="0">
-              <a:buNone/>
-            </a:pPr>
-            <a:r>
-              <a:rPr lang="it-IT" dirty="0"/>
-              <a:t>La sintassi del linguaggio C# consiste di (</a:t>
-            </a:r>
-            <a:r>
-              <a:rPr lang="it-IT" u="sng" dirty="0">
-                <a:hlinkClick r:id="rId2"/>
-              </a:rPr>
-              <a:t>https://msdn.microsoft.com/it-it/library/z1zx9t92.aspx</a:t>
-            </a:r>
-            <a:r>
-              <a:rPr lang="it-IT" dirty="0"/>
-              <a:t>):</a:t>
-            </a:r>
-          </a:p>
-          <a:p>
-            <a:r>
-              <a:rPr lang="it-IT" dirty="0"/>
-              <a:t>struttura generale del programma (funzioni, variabili, costanti, operazioni)</a:t>
-            </a:r>
-          </a:p>
-          <a:p>
-            <a:r>
-              <a:rPr lang="it-IT" dirty="0"/>
-              <a:t>strutture di controllo (if, for, while, switch)</a:t>
-            </a:r>
-          </a:p>
-          <a:p>
-            <a:endParaRPr lang="it-IT" i="1" dirty="0">
-              <a:solidFill>
-                <a:srgbClr val="C00000"/>
-              </a:solidFill>
-            </a:endParaRPr>
-          </a:p>
-          <a:p>
-            <a:r>
-              <a:rPr lang="it-IT" i="1" dirty="0"/>
-              <a:t>classi e </a:t>
-            </a:r>
-            <a:r>
-              <a:rPr lang="it-IT" b="1" i="1" dirty="0">
-                <a:solidFill>
-                  <a:srgbClr val="C00000"/>
-                </a:solidFill>
-              </a:rPr>
-              <a:t>oggetti</a:t>
-            </a:r>
-            <a:endParaRPr lang="it-IT" i="1" dirty="0">
-              <a:solidFill>
-                <a:srgbClr val="C00000"/>
-              </a:solidFill>
-            </a:endParaRPr>
-          </a:p>
-          <a:p>
-            <a:endParaRPr lang="it-IT" dirty="0">
-              <a:latin typeface="Courier New" panose="02070309020205020404" pitchFamily="49" charset="0"/>
-              <a:cs typeface="Courier New" panose="02070309020205020404" pitchFamily="49" charset="0"/>
-            </a:endParaRPr>
+            <a:fld id="{FB20157B-BF21-4976-810E-1ABA2FD4E36F}" type="slidenum">
+              <a:rPr lang="it-IT" smtClean="0"/>
+              <a:pPr/>
+              <a:t>10</a:t>
+            </a:fld>
+            <a:endParaRPr lang="it-IT"/>
           </a:p>
         </p:txBody>
       </p:sp>
       <p:sp>
         <p:nvSpPr>
-          <p:cNvPr id="9" name="Title 2"/>
+          <p:cNvPr id="6" name="Title 5"/>
           <p:cNvSpPr>
             <a:spLocks noGrp="1"/>
           </p:cNvSpPr>
@@ -2487,48 +2531,59 @@
           <a:lstStyle/>
           <a:p>
             <a:r>
-              <a:rPr lang="it-IT" dirty="0"/>
-              <a:t>Come è fatto un programma C#</a:t>
-            </a:r>
-            <a:endParaRPr lang="it-IT" sz="2800" dirty="0">
-              <a:effectLst/>
-            </a:endParaRPr>
+              <a:rPr lang="it-IT" sz="3600" dirty="0">
+                <a:latin typeface="Calibri" panose="020F0502020204030204" pitchFamily="34" charset="0"/>
+              </a:rPr>
+              <a:t>Il processo di compilazione</a:t>
+            </a:r>
           </a:p>
         </p:txBody>
       </p:sp>
-      <p:sp>
-        <p:nvSpPr>
-          <p:cNvPr id="6" name="Slide Number Placeholder 4"/>
-          <p:cNvSpPr>
-            <a:spLocks noGrp="1"/>
-          </p:cNvSpPr>
-          <p:nvPr>
-            <p:ph type="sldNum" sz="quarter" idx="12"/>
-          </p:nvPr>
-        </p:nvSpPr>
-        <p:spPr>
+      <p:pic>
+        <p:nvPicPr>
+          <p:cNvPr id="3074" name="Picture 2" descr="https://lh3.googleusercontent.com/Cu1aUc0Xs_sPr71olaQ1u_XxejkIQFB3IARcpbCJ0BTwkGNHizLGncnw__AkzT-pkXDzWHe2BbE8I40w1oTFu6GTfO9p2EHwL6Fd2MRO2TXAwL0FIyN-kQrCOHlOS3_uztxd0BjxO6sdHW8"/>
+          <p:cNvPicPr>
+            <a:picLocks noChangeAspect="1" noChangeArrowheads="1"/>
+          </p:cNvPicPr>
+          <p:nvPr/>
+        </p:nvPicPr>
+        <p:blipFill>
+          <a:blip r:embed="rId2">
+            <a:extLst>
+              <a:ext uri="{28A0092B-C50C-407E-A947-70E740481C1C}">
+                <a14:useLocalDpi xmlns:a14="http://schemas.microsoft.com/office/drawing/2010/main" val="0"/>
+              </a:ext>
+            </a:extLst>
+          </a:blip>
+          <a:srcRect/>
+          <a:stretch>
+            <a:fillRect/>
+          </a:stretch>
+        </p:blipFill>
+        <p:spPr bwMode="auto">
           <a:xfrm>
-            <a:off x="9027918" y="6590846"/>
-            <a:ext cx="855983" cy="143633"/>
+            <a:off x="179785" y="1316607"/>
+            <a:ext cx="5616624" cy="4551934"/>
           </a:xfrm>
+          <a:prstGeom prst="rect">
+            <a:avLst/>
+          </a:prstGeom>
+          <a:noFill/>
+          <a:extLst>
+            <a:ext uri="{909E8E84-426E-40DD-AFC4-6F175D3DCCD1}">
+              <a14:hiddenFill xmlns:a14="http://schemas.microsoft.com/office/drawing/2010/main">
+                <a:solidFill>
+                  <a:srgbClr val="FFFFFF"/>
+                </a:solidFill>
+              </a14:hiddenFill>
+            </a:ext>
+          </a:extLst>
         </p:spPr>
-        <p:txBody>
-          <a:bodyPr/>
-          <a:lstStyle/>
-          <a:p>
-            <a:fld id="{FB20157B-BF21-4976-810E-1ABA2FD4E36F}" type="slidenum">
-              <a:rPr lang="it-IT" smtClean="0"/>
-              <a:pPr/>
-              <a:t>10</a:t>
-            </a:fld>
-            <a:endParaRPr lang="it-IT"/>
-          </a:p>
-        </p:txBody>
-      </p:sp>
+      </p:pic>
     </p:spTree>
     <p:extLst>
       <p:ext uri="{BB962C8B-B14F-4D97-AF65-F5344CB8AC3E}">
-        <p14:creationId xmlns:p14="http://schemas.microsoft.com/office/powerpoint/2010/main" val="715918362"/>
+        <p14:creationId xmlns:p14="http://schemas.microsoft.com/office/powerpoint/2010/main" val="1437793701"/>
       </p:ext>
     </p:extLst>
   </p:cSld>
@@ -2571,118 +2626,140 @@
           <a:lstStyle/>
           <a:p>
             <a:r>
+              <a:rPr lang="it-IT" dirty="0"/>
+              <a:t>C# è un linguaggio di programmazione </a:t>
+            </a:r>
+            <a:r>
               <a:rPr lang="it-IT" b="1" dirty="0">
                 <a:solidFill>
                   <a:srgbClr val="C00000"/>
                 </a:solidFill>
               </a:rPr>
-              <a:t>Code Style</a:t>
+              <a:t>compilato </a:t>
             </a:r>
             <a:r>
               <a:rPr lang="it-IT" dirty="0"/>
-              <a:t>: insieme di sane abitudini, oltre alla scrittura corretta del codice.</a:t>
-            </a:r>
-          </a:p>
-          <a:p>
+              <a:t>di tipo </a:t>
+            </a:r>
+            <a:r>
+              <a:rPr lang="it-IT" b="1" dirty="0">
+                <a:solidFill>
+                  <a:srgbClr val="C00000"/>
+                </a:solidFill>
+              </a:rPr>
+              <a:t>imperativo</a:t>
+            </a:r>
+            <a:r>
+              <a:rPr lang="it-IT" dirty="0"/>
+              <a:t>:</a:t>
+            </a:r>
+          </a:p>
+          <a:p>
+            <a:pPr lvl="1"/>
+            <a:r>
+              <a:rPr lang="it-IT" sz="1400" dirty="0"/>
+              <a:t>prescrive le operazioni che il processore deve compiere</a:t>
+            </a:r>
+          </a:p>
+          <a:p>
+            <a:pPr lvl="1"/>
+            <a:r>
+              <a:rPr lang="it-IT" sz="1400" dirty="0"/>
+              <a:t>l'esecuzione delle istruzioni avviene nell’ordine in cui appaiono nel programma</a:t>
+            </a:r>
+            <a:r>
+              <a:rPr lang="it-IT" sz="1400" i="1" dirty="0"/>
+              <a:t> (eccezione: strutture di controllo)</a:t>
+            </a:r>
+            <a:endParaRPr lang="it-IT" sz="1400" dirty="0"/>
+          </a:p>
+          <a:p>
+            <a:pPr marL="0" indent="0">
+              <a:buNone/>
+            </a:pPr>
             <a:endParaRPr lang="it-IT" dirty="0"/>
           </a:p>
           <a:p>
-            <a:r>
+            <a:pPr marL="0" indent="0" algn="ctr">
+              <a:buNone/>
+            </a:pPr>
+            <a:r>
+              <a:rPr lang="it-IT" b="1" dirty="0">
+                <a:solidFill>
+                  <a:srgbClr val="C00000"/>
+                </a:solidFill>
+              </a:rPr>
+              <a:t>Programma = Algoritmi + Strutture Dati </a:t>
+            </a:r>
+            <a:r>
+              <a:rPr lang="it-IT" b="1" i="1" dirty="0">
+                <a:solidFill>
+                  <a:srgbClr val="C00000"/>
+                </a:solidFill>
+              </a:rPr>
+              <a:t>(N. Wirth, circa 1976)</a:t>
+            </a:r>
+            <a:endParaRPr lang="it-IT" dirty="0">
+              <a:solidFill>
+                <a:srgbClr val="C00000"/>
+              </a:solidFill>
+            </a:endParaRPr>
+          </a:p>
+          <a:p>
+            <a:pPr marL="0" indent="0">
+              <a:buNone/>
+            </a:pPr>
+            <a:br>
               <a:rPr lang="it-IT" dirty="0"/>
-              <a:t>Ad esempio:</a:t>
+            </a:br>
+            <a:endParaRPr lang="it-IT" dirty="0"/>
+          </a:p>
+          <a:p>
+            <a:r>
+              <a:rPr lang="it-IT" dirty="0"/>
+              <a:t>La struttura del programma consiste in:</a:t>
             </a:r>
           </a:p>
           <a:p>
             <a:pPr lvl="1"/>
             <a:r>
-              <a:rPr lang="it-IT" sz="1400" b="1" dirty="0">
-                <a:solidFill>
-                  <a:srgbClr val="C00000"/>
-                </a:solidFill>
-              </a:rPr>
-              <a:t>indentare</a:t>
-            </a:r>
-            <a:r>
-              <a:rPr lang="it-IT" sz="1400" b="1" dirty="0"/>
-              <a:t> </a:t>
-            </a:r>
-            <a:r>
               <a:rPr lang="it-IT" sz="1400" dirty="0"/>
-              <a:t>il codice</a:t>
+              <a:t>una parte di dichiarazione in cui si dichiarano tutte le variabili del programma e il loro tipo</a:t>
             </a:r>
           </a:p>
           <a:p>
             <a:pPr lvl="1"/>
             <a:r>
-              <a:rPr lang="it-IT" sz="1400" b="1" dirty="0">
-                <a:solidFill>
-                  <a:srgbClr val="C00000"/>
-                </a:solidFill>
-              </a:rPr>
-              <a:t>commentare</a:t>
-            </a:r>
-            <a:r>
-              <a:rPr lang="it-IT" sz="1400" b="1" dirty="0"/>
-              <a:t> </a:t>
-            </a:r>
-            <a:r>
               <a:rPr lang="it-IT" sz="1400" dirty="0"/>
-              <a:t>il codice (per se stessi e per gli altri)</a:t>
-            </a:r>
-          </a:p>
-          <a:p>
-            <a:pPr lvl="1"/>
+              <a:t>una parte che descrive l’algoritmo risolutivo utilizzato, mediante istruzioni del linguaggio. Le istruzioni si dividono in:</a:t>
+            </a:r>
+          </a:p>
+          <a:p>
+            <a:pPr lvl="2"/>
             <a:r>
               <a:rPr lang="it-IT" sz="1400" dirty="0"/>
-              <a:t>scegliere un </a:t>
-            </a:r>
-            <a:r>
-              <a:rPr lang="it-IT" sz="1400" b="1" dirty="0">
-                <a:solidFill>
-                  <a:srgbClr val="C00000"/>
-                </a:solidFill>
-              </a:rPr>
-              <a:t>modo coerente </a:t>
-            </a:r>
+              <a:t>istruzioni di lettura e scrittura</a:t>
+            </a:r>
+          </a:p>
+          <a:p>
+            <a:pPr lvl="2"/>
             <a:r>
               <a:rPr lang="it-IT" sz="1400" dirty="0"/>
-              <a:t>di scrivere il codice (parentesi graffe a capo o non a capo, spaziature...)</a:t>
-            </a:r>
-          </a:p>
-          <a:p>
-            <a:pPr lvl="1"/>
+              <a:t>istruzioni di assegnamento (astrazione di cella di memoria)</a:t>
+            </a:r>
+          </a:p>
+          <a:p>
+            <a:pPr lvl="2"/>
             <a:r>
               <a:rPr lang="it-IT" sz="1400" dirty="0"/>
-              <a:t>scegliere </a:t>
-            </a:r>
-            <a:r>
-              <a:rPr lang="it-IT" sz="1400" b="1" dirty="0">
-                <a:solidFill>
-                  <a:srgbClr val="C00000"/>
-                </a:solidFill>
-              </a:rPr>
-              <a:t>nomi lunghi </a:t>
-            </a:r>
-            <a:r>
-              <a:rPr lang="it-IT" sz="1400" dirty="0"/>
-              <a:t>ed </a:t>
-            </a:r>
-            <a:r>
-              <a:rPr lang="it-IT" sz="1400" b="1" dirty="0">
-                <a:solidFill>
-                  <a:srgbClr val="C00000"/>
-                </a:solidFill>
-              </a:rPr>
-              <a:t>esplicativi</a:t>
-            </a:r>
-            <a:r>
-              <a:rPr lang="it-IT" sz="1400" b="1" dirty="0"/>
-              <a:t> </a:t>
-            </a:r>
-            <a:r>
-              <a:rPr lang="it-IT" sz="1400" dirty="0"/>
-              <a:t>per le variabili</a:t>
-            </a:r>
+              <a:t>istruzioni di controllo</a:t>
+            </a:r>
+            <a:br>
+              <a:rPr lang="it-IT" dirty="0"/>
+            </a:br>
+            <a:endParaRPr lang="it-IT" b="0" dirty="0">
+              <a:effectLst/>
+            </a:endParaRPr>
           </a:p>
         </p:txBody>
       </p:sp>
@@ -2702,11 +2779,12 @@
           <a:lstStyle/>
           <a:p>
             <a:r>
-              <a:rPr lang="it-IT" sz="2800" dirty="0">
-                <a:effectLst/>
-              </a:rPr>
-              <a:t>Quando scriviamo codice....</a:t>
-            </a:r>
+              <a:rPr lang="it-IT" dirty="0"/>
+              <a:t>Il linguaggio C#</a:t>
+            </a:r>
+            <a:endParaRPr lang="it-IT" dirty="0">
+              <a:effectLst/>
+            </a:endParaRPr>
           </a:p>
         </p:txBody>
       </p:sp>
@@ -2742,7 +2820,7 @@
     </p:spTree>
     <p:extLst>
       <p:ext uri="{BB962C8B-B14F-4D97-AF65-F5344CB8AC3E}">
-        <p14:creationId xmlns:p14="http://schemas.microsoft.com/office/powerpoint/2010/main" val="3497858168"/>
+        <p14:creationId xmlns:p14="http://schemas.microsoft.com/office/powerpoint/2010/main" val="2524100352"/>
       </p:ext>
     </p:extLst>
   </p:cSld>
@@ -2771,128 +2849,6 @@
       </p:grpSpPr>
       <p:sp>
         <p:nvSpPr>
-          <p:cNvPr id="2" name="Content Placeholder 1"/>
-          <p:cNvSpPr>
-            <a:spLocks noGrp="1"/>
-          </p:cNvSpPr>
-          <p:nvPr>
-            <p:ph idx="1"/>
-          </p:nvPr>
-        </p:nvSpPr>
-        <p:spPr/>
-        <p:txBody>
-          <a:bodyPr/>
-          <a:lstStyle/>
-          <a:p>
-            <a:r>
-              <a:rPr lang="it-IT" b="1" dirty="0">
-                <a:solidFill>
-                  <a:srgbClr val="C00000"/>
-                </a:solidFill>
-              </a:rPr>
-              <a:t>Esercizio 1</a:t>
-            </a:r>
-            <a:r>
-              <a:rPr lang="it-IT" dirty="0"/>
-              <a:t>: scrivete un programma che, letti due numeri interi da terminale, restituisca il loro rapporto.</a:t>
-            </a:r>
-          </a:p>
-          <a:p>
-            <a:r>
-              <a:rPr lang="it-IT" b="1" dirty="0">
-                <a:solidFill>
-                  <a:srgbClr val="C00000"/>
-                </a:solidFill>
-              </a:rPr>
-              <a:t>Esercizio 2</a:t>
-            </a:r>
-            <a:r>
-              <a:rPr lang="it-IT" dirty="0"/>
-              <a:t>: Scrivere un programma che scrive a terminale la radice quadrata di 2, il cubo di 2 il seno di pigreco/4.</a:t>
-            </a:r>
-          </a:p>
-          <a:p>
-            <a:r>
-              <a:rPr lang="it-IT" b="1" dirty="0">
-                <a:solidFill>
-                  <a:srgbClr val="C00000"/>
-                </a:solidFill>
-              </a:rPr>
-              <a:t>Esercizio 3</a:t>
-            </a:r>
-            <a:r>
-              <a:rPr lang="it-IT" dirty="0"/>
-              <a:t>: Scrivere un programma che chieda all'utente di inserire un intero a scelta tra 1 e 2, e restituisca a terminale il valore inserito, o un messaggio di errore in caso di inserimento di altri interi.</a:t>
-            </a:r>
-          </a:p>
-          <a:p>
-            <a:r>
-              <a:rPr lang="it-IT" b="1" dirty="0">
-                <a:solidFill>
-                  <a:srgbClr val="C00000"/>
-                </a:solidFill>
-              </a:rPr>
-              <a:t>Esercizio 4</a:t>
-            </a:r>
-            <a:r>
-              <a:rPr lang="it-IT" dirty="0"/>
-              <a:t>: Scrivere un programma che, dato un array di n interi casuali, lo ordini dal piu piccolo al piu grande (suggerimento: create un array specificando voi alcuni numeri a caso per testare che l'ordinamento funzioni).</a:t>
-            </a:r>
-          </a:p>
-          <a:p>
-            <a:r>
-              <a:rPr lang="it-IT" b="1" dirty="0">
-                <a:solidFill>
-                  <a:srgbClr val="C00000"/>
-                </a:solidFill>
-              </a:rPr>
-              <a:t>Esercizio 5</a:t>
-            </a:r>
-            <a:r>
-              <a:rPr lang="it-IT" dirty="0"/>
-              <a:t>: Scrivere una funzione che calcoli il fattoriale di un numero intero non negativo.</a:t>
-            </a:r>
-          </a:p>
-          <a:p>
-            <a:r>
-              <a:rPr lang="it-IT" b="1" dirty="0">
-                <a:solidFill>
-                  <a:srgbClr val="C00000"/>
-                </a:solidFill>
-              </a:rPr>
-              <a:t>Esercizio 6</a:t>
-            </a:r>
-            <a:r>
-              <a:rPr lang="it-IT" dirty="0"/>
-              <a:t>: Scrivere la funzione fattoriale in modo ricorsivo, cioe facendo in modo che la funzione che calcola il fattoriale chiami se stessa.</a:t>
-            </a:r>
-          </a:p>
-          <a:p>
-            <a:r>
-              <a:rPr lang="it-IT" b="1" dirty="0">
-                <a:solidFill>
-                  <a:srgbClr val="C00000"/>
-                </a:solidFill>
-              </a:rPr>
-              <a:t>Esercizio 7</a:t>
-            </a:r>
-            <a:r>
-              <a:rPr lang="it-IT" b="1" dirty="0"/>
-              <a:t>: </a:t>
-            </a:r>
-            <a:r>
-              <a:rPr lang="it-IT" dirty="0"/>
-              <a:t>Scrivere un programma che, data una stringa, restituisca un conteggio delle lettere in essa presenti (si consiglia di usare un array con 26 posizioni, una per ogni lettera dell'alfabeto, inizializzato tutto a zeri scorrere la stringa e incrementare il contatore della lettera corrispondente).</a:t>
-            </a:r>
-            <a:endParaRPr lang="it-IT" dirty="0">
-              <a:latin typeface="Courier New" panose="02070309020205020404" pitchFamily="49" charset="0"/>
-              <a:cs typeface="Courier New" panose="02070309020205020404" pitchFamily="49" charset="0"/>
-            </a:endParaRPr>
-          </a:p>
-        </p:txBody>
-      </p:sp>
-      <p:sp>
-        <p:nvSpPr>
           <p:cNvPr id="9" name="Title 2"/>
           <p:cNvSpPr>
             <a:spLocks noGrp="1"/>
@@ -2908,9 +2864,9 @@
           <a:p>
             <a:r>
               <a:rPr lang="it-IT" dirty="0"/>
-              <a:t>Esercizi</a:t>
-            </a:r>
-            <a:endParaRPr lang="it-IT" sz="2800" dirty="0">
+              <a:t>I linguaggi a Virtual machine</a:t>
+            </a:r>
+            <a:endParaRPr lang="it-IT" dirty="0">
               <a:effectLst/>
             </a:endParaRPr>
           </a:p>
@@ -2945,10 +2901,51 @@
           </a:p>
         </p:txBody>
       </p:sp>
+      <p:pic>
+        <p:nvPicPr>
+          <p:cNvPr id="2050" name="Picture 2" descr="Dal codice C# all'esecuzione nel computer"/>
+          <p:cNvPicPr>
+            <a:picLocks noChangeAspect="1" noChangeArrowheads="1"/>
+          </p:cNvPicPr>
+          <p:nvPr/>
+        </p:nvPicPr>
+        <p:blipFill>
+          <a:blip r:embed="rId2">
+            <a:extLst>
+              <a:ext uri="{28A0092B-C50C-407E-A947-70E740481C1C}">
+                <a14:useLocalDpi xmlns:a14="http://schemas.microsoft.com/office/drawing/2010/main" val="0"/>
+              </a:ext>
+            </a:extLst>
+          </a:blip>
+          <a:srcRect/>
+          <a:stretch>
+            <a:fillRect/>
+          </a:stretch>
+        </p:blipFill>
+        <p:spPr bwMode="auto">
+          <a:xfrm>
+            <a:off x="3115182" y="1001091"/>
+            <a:ext cx="5904656" cy="5273423"/>
+          </a:xfrm>
+          <a:prstGeom prst="rect">
+            <a:avLst/>
+          </a:prstGeom>
+          <a:noFill/>
+          <a:extLst>
+            <a:ext uri="{909E8E84-426E-40DD-AFC4-6F175D3DCCD1}">
+              <a14:hiddenFill xmlns:a14="http://schemas.microsoft.com/office/drawing/2010/main">
+                <a:solidFill>
+                  <a:srgbClr val="FFFFFF"/>
+                </a:solidFill>
+              </a14:hiddenFill>
+            </a:ext>
+          </a:extLst>
+        </p:spPr>
+      </p:pic>
     </p:spTree>
     <p:extLst>
       <p:ext uri="{BB962C8B-B14F-4D97-AF65-F5344CB8AC3E}">
-        <p14:creationId xmlns:p14="http://schemas.microsoft.com/office/powerpoint/2010/main" val="3921910409"/>
+        <p14:creationId xmlns:p14="http://schemas.microsoft.com/office/powerpoint/2010/main" val="3193027289"/>
       </p:ext>
     </p:extLst>
   </p:cSld>
@@ -2977,6 +2974,146 @@
       </p:grpSpPr>
       <p:sp>
         <p:nvSpPr>
+          <p:cNvPr id="2" name="Content Placeholder 1"/>
+          <p:cNvSpPr>
+            <a:spLocks noGrp="1"/>
+          </p:cNvSpPr>
+          <p:nvPr>
+            <p:ph idx="1"/>
+          </p:nvPr>
+        </p:nvSpPr>
+        <p:spPr/>
+        <p:txBody>
+          <a:bodyPr/>
+          <a:lstStyle/>
+          <a:p>
+            <a:pPr marL="0" indent="0">
+              <a:buNone/>
+            </a:pPr>
+            <a:r>
+              <a:rPr lang="it-IT" dirty="0"/>
+              <a:t>Ogni programma in C#:</a:t>
+            </a:r>
+          </a:p>
+          <a:p>
+            <a:r>
+              <a:rPr lang="it-IT" dirty="0"/>
+              <a:t>consiste di </a:t>
+            </a:r>
+            <a:r>
+              <a:rPr lang="it-IT" b="1" dirty="0">
+                <a:solidFill>
+                  <a:srgbClr val="C00000"/>
+                </a:solidFill>
+              </a:rPr>
+              <a:t>uno o più file .cs</a:t>
+            </a:r>
+            <a:endParaRPr lang="it-IT" dirty="0"/>
+          </a:p>
+          <a:p>
+            <a:r>
+              <a:rPr lang="it-IT" dirty="0"/>
+              <a:t>deve contenere una </a:t>
+            </a:r>
+            <a:r>
+              <a:rPr lang="it-IT" b="1" dirty="0">
+                <a:solidFill>
+                  <a:srgbClr val="C00000"/>
+                </a:solidFill>
+              </a:rPr>
+              <a:t>funzione main specifica</a:t>
+            </a:r>
+            <a:r>
+              <a:rPr lang="it-IT" dirty="0"/>
+              <a:t>, di questo formato:</a:t>
+            </a:r>
+            <a:br>
+              <a:rPr lang="it-IT" dirty="0"/>
+            </a:br>
+            <a:br>
+              <a:rPr lang="it-IT" sz="1000" dirty="0"/>
+            </a:br>
+            <a:r>
+              <a:rPr lang="it-IT" dirty="0">
+                <a:latin typeface="Courier New" panose="02070309020205020404" pitchFamily="49" charset="0"/>
+                <a:cs typeface="Courier New" panose="02070309020205020404" pitchFamily="49" charset="0"/>
+              </a:rPr>
+              <a:t>static void Main(string[] args) { ... }</a:t>
+            </a:r>
+          </a:p>
+          <a:p>
+            <a:endParaRPr lang="it-IT" dirty="0">
+              <a:latin typeface="Courier New" panose="02070309020205020404" pitchFamily="49" charset="0"/>
+              <a:cs typeface="Courier New" panose="02070309020205020404" pitchFamily="49" charset="0"/>
+            </a:endParaRPr>
+          </a:p>
+          <a:p>
+            <a:pPr marL="0" indent="0">
+              <a:buNone/>
+            </a:pPr>
+            <a:r>
+              <a:rPr lang="it-IT" dirty="0"/>
+              <a:t>La sintassi del linguaggio C# consiste di (</a:t>
+            </a:r>
+            <a:r>
+              <a:rPr lang="it-IT" u="sng" dirty="0">
+                <a:hlinkClick r:id="rId2"/>
+              </a:rPr>
+              <a:t>https://msdn.microsoft.com/it-it/library/z1zx9t92.aspx</a:t>
+            </a:r>
+            <a:r>
+              <a:rPr lang="it-IT" dirty="0"/>
+              <a:t>):</a:t>
+            </a:r>
+          </a:p>
+          <a:p>
+            <a:r>
+              <a:rPr lang="it-IT" dirty="0"/>
+              <a:t>struttura generale del programma (funzioni, variabili, costanti, operazioni)</a:t>
+            </a:r>
+          </a:p>
+          <a:p>
+            <a:r>
+              <a:rPr lang="it-IT" dirty="0"/>
+              <a:t>strutture di controllo (if, for, while, switch)</a:t>
+            </a:r>
+          </a:p>
+          <a:p>
+            <a:endParaRPr lang="it-IT" i="1" dirty="0">
+              <a:solidFill>
+                <a:srgbClr val="C00000"/>
+              </a:solidFill>
+            </a:endParaRPr>
+          </a:p>
+          <a:p>
+            <a:r>
+              <a:rPr lang="it-IT" i="1" dirty="0"/>
+              <a:t>classi e </a:t>
+            </a:r>
+            <a:r>
+              <a:rPr lang="it-IT" b="1" i="1" dirty="0">
+                <a:solidFill>
+                  <a:srgbClr val="C00000"/>
+                </a:solidFill>
+              </a:rPr>
+              <a:t>oggetti</a:t>
+            </a:r>
+            <a:endParaRPr lang="it-IT" i="1" dirty="0">
+              <a:solidFill>
+                <a:srgbClr val="C00000"/>
+              </a:solidFill>
+            </a:endParaRPr>
+          </a:p>
+          <a:p>
+            <a:endParaRPr lang="it-IT" dirty="0">
+              <a:latin typeface="Courier New" panose="02070309020205020404" pitchFamily="49" charset="0"/>
+              <a:cs typeface="Courier New" panose="02070309020205020404" pitchFamily="49" charset="0"/>
+            </a:endParaRPr>
+          </a:p>
+        </p:txBody>
+      </p:sp>
+      <p:sp>
+        <p:nvSpPr>
           <p:cNvPr id="9" name="Title 2"/>
           <p:cNvSpPr>
             <a:spLocks noGrp="1"/>
@@ -2992,7 +3129,7 @@
           <a:p>
             <a:r>
               <a:rPr lang="it-IT" dirty="0"/>
-              <a:t>Soluzioni?</a:t>
+              <a:t>Come è fatto un programma C#</a:t>
             </a:r>
             <a:endParaRPr lang="it-IT" sz="2800" dirty="0">
               <a:effectLst/>
@@ -3029,6 +3166,510 @@
           </a:p>
         </p:txBody>
       </p:sp>
+    </p:spTree>
+    <p:extLst>
+      <p:ext uri="{BB962C8B-B14F-4D97-AF65-F5344CB8AC3E}">
+        <p14:creationId xmlns:p14="http://schemas.microsoft.com/office/powerpoint/2010/main" val="715918362"/>
+      </p:ext>
+    </p:extLst>
+  </p:cSld>
+  <p:clrMapOvr>
+    <a:masterClrMapping/>
+  </p:clrMapOvr>
+</p:sld>
+</file>
+
+<file path=ppt/slides/slide14.xml><?xml version="1.0" encoding="utf-8"?>
+<p:sld xmlns:a="http://schemas.openxmlformats.org/drawingml/2006/main" xmlns:r="http://schemas.openxmlformats.org/officeDocument/2006/relationships" xmlns:p="http://schemas.openxmlformats.org/presentationml/2006/main">
+  <p:cSld>
+    <p:spTree>
+      <p:nvGrpSpPr>
+        <p:cNvPr id="1" name=""/>
+        <p:cNvGrpSpPr/>
+        <p:nvPr/>
+      </p:nvGrpSpPr>
+      <p:grpSpPr>
+        <a:xfrm>
+          <a:off x="0" y="0"/>
+          <a:ext cx="0" cy="0"/>
+          <a:chOff x="0" y="0"/>
+          <a:chExt cx="0" cy="0"/>
+        </a:xfrm>
+      </p:grpSpPr>
+      <p:sp>
+        <p:nvSpPr>
+          <p:cNvPr id="2" name="Content Placeholder 1"/>
+          <p:cNvSpPr>
+            <a:spLocks noGrp="1"/>
+          </p:cNvSpPr>
+          <p:nvPr>
+            <p:ph idx="1"/>
+          </p:nvPr>
+        </p:nvSpPr>
+        <p:spPr/>
+        <p:txBody>
+          <a:bodyPr/>
+          <a:lstStyle/>
+          <a:p>
+            <a:r>
+              <a:rPr lang="it-IT" b="1" dirty="0">
+                <a:solidFill>
+                  <a:srgbClr val="C00000"/>
+                </a:solidFill>
+              </a:rPr>
+              <a:t>Code Style</a:t>
+            </a:r>
+            <a:r>
+              <a:rPr lang="it-IT" dirty="0"/>
+              <a:t>: insieme di sane abitudini, oltre alla scrittura corretta del codice.</a:t>
+            </a:r>
+          </a:p>
+          <a:p>
+            <a:endParaRPr lang="it-IT" dirty="0"/>
+          </a:p>
+          <a:p>
+            <a:r>
+              <a:rPr lang="it-IT" dirty="0"/>
+              <a:t>Ad esempio:</a:t>
+            </a:r>
+          </a:p>
+          <a:p>
+            <a:pPr lvl="1"/>
+            <a:r>
+              <a:rPr lang="it-IT" sz="1400" b="1" dirty="0">
+                <a:solidFill>
+                  <a:srgbClr val="C00000"/>
+                </a:solidFill>
+              </a:rPr>
+              <a:t>indentare</a:t>
+            </a:r>
+            <a:r>
+              <a:rPr lang="it-IT" sz="1400" b="1" dirty="0"/>
+              <a:t> </a:t>
+            </a:r>
+            <a:r>
+              <a:rPr lang="it-IT" sz="1400" dirty="0"/>
+              <a:t>il codice</a:t>
+            </a:r>
+          </a:p>
+          <a:p>
+            <a:pPr lvl="1"/>
+            <a:r>
+              <a:rPr lang="it-IT" sz="1400" b="1" dirty="0">
+                <a:solidFill>
+                  <a:srgbClr val="C00000"/>
+                </a:solidFill>
+              </a:rPr>
+              <a:t>commentare</a:t>
+            </a:r>
+            <a:r>
+              <a:rPr lang="it-IT" sz="1400" b="1" dirty="0"/>
+              <a:t> </a:t>
+            </a:r>
+            <a:r>
+              <a:rPr lang="it-IT" sz="1400" dirty="0"/>
+              <a:t>il codice (per se stessi e per gli altri)</a:t>
+            </a:r>
+          </a:p>
+          <a:p>
+            <a:pPr lvl="1"/>
+            <a:r>
+              <a:rPr lang="it-IT" sz="1400" dirty="0"/>
+              <a:t>scegliere un </a:t>
+            </a:r>
+            <a:r>
+              <a:rPr lang="it-IT" sz="1400" b="1" dirty="0">
+                <a:solidFill>
+                  <a:srgbClr val="C00000"/>
+                </a:solidFill>
+              </a:rPr>
+              <a:t>modo coerente </a:t>
+            </a:r>
+            <a:r>
+              <a:rPr lang="it-IT" sz="1400" dirty="0"/>
+              <a:t>di scrivere il codice (parentesi graffe a capo o non a capo, spaziature...)</a:t>
+            </a:r>
+          </a:p>
+          <a:p>
+            <a:pPr lvl="1"/>
+            <a:r>
+              <a:rPr lang="it-IT" sz="1400" dirty="0"/>
+              <a:t>scegliere </a:t>
+            </a:r>
+            <a:r>
+              <a:rPr lang="it-IT" sz="1400" b="1" dirty="0">
+                <a:solidFill>
+                  <a:srgbClr val="C00000"/>
+                </a:solidFill>
+              </a:rPr>
+              <a:t>nomi lunghi </a:t>
+            </a:r>
+            <a:r>
+              <a:rPr lang="it-IT" sz="1400" dirty="0"/>
+              <a:t>ed </a:t>
+            </a:r>
+            <a:r>
+              <a:rPr lang="it-IT" sz="1400" b="1" dirty="0">
+                <a:solidFill>
+                  <a:srgbClr val="C00000"/>
+                </a:solidFill>
+              </a:rPr>
+              <a:t>esplicativi</a:t>
+            </a:r>
+            <a:r>
+              <a:rPr lang="it-IT" sz="1400" b="1" dirty="0"/>
+              <a:t> </a:t>
+            </a:r>
+            <a:r>
+              <a:rPr lang="it-IT" sz="1400" dirty="0"/>
+              <a:t>per le variabili</a:t>
+            </a:r>
+          </a:p>
+        </p:txBody>
+      </p:sp>
+      <p:sp>
+        <p:nvSpPr>
+          <p:cNvPr id="9" name="Title 2"/>
+          <p:cNvSpPr>
+            <a:spLocks noGrp="1"/>
+          </p:cNvSpPr>
+          <p:nvPr>
+            <p:ph type="title"/>
+          </p:nvPr>
+        </p:nvSpPr>
+        <p:spPr/>
+        <p:txBody>
+          <a:bodyPr/>
+          <a:lstStyle/>
+          <a:p>
+            <a:r>
+              <a:rPr lang="it-IT" sz="2800" dirty="0">
+                <a:effectLst/>
+              </a:rPr>
+              <a:t>Quando scriviamo codice....</a:t>
+            </a:r>
+          </a:p>
+        </p:txBody>
+      </p:sp>
+      <p:sp>
+        <p:nvSpPr>
+          <p:cNvPr id="6" name="Slide Number Placeholder 4"/>
+          <p:cNvSpPr>
+            <a:spLocks noGrp="1"/>
+          </p:cNvSpPr>
+          <p:nvPr>
+            <p:ph type="sldNum" sz="quarter" idx="12"/>
+          </p:nvPr>
+        </p:nvSpPr>
+        <p:spPr>
+          <a:xfrm>
+            <a:off x="9027918" y="6590846"/>
+            <a:ext cx="855983" cy="143633"/>
+          </a:xfrm>
+        </p:spPr>
+        <p:txBody>
+          <a:bodyPr/>
+          <a:lstStyle/>
+          <a:p>
+            <a:fld id="{FB20157B-BF21-4976-810E-1ABA2FD4E36F}" type="slidenum">
+              <a:rPr lang="it-IT" smtClean="0"/>
+              <a:pPr/>
+              <a:t>14</a:t>
+            </a:fld>
+            <a:endParaRPr lang="it-IT"/>
+          </a:p>
+        </p:txBody>
+      </p:sp>
+    </p:spTree>
+    <p:extLst>
+      <p:ext uri="{BB962C8B-B14F-4D97-AF65-F5344CB8AC3E}">
+        <p14:creationId xmlns:p14="http://schemas.microsoft.com/office/powerpoint/2010/main" val="3497858168"/>
+      </p:ext>
+    </p:extLst>
+  </p:cSld>
+  <p:clrMapOvr>
+    <a:masterClrMapping/>
+  </p:clrMapOvr>
+</p:sld>
+</file>
+
+<file path=ppt/slides/slide15.xml><?xml version="1.0" encoding="utf-8"?>
+<p:sld xmlns:a="http://schemas.openxmlformats.org/drawingml/2006/main" xmlns:r="http://schemas.openxmlformats.org/officeDocument/2006/relationships" xmlns:p="http://schemas.openxmlformats.org/presentationml/2006/main">
+  <p:cSld>
+    <p:spTree>
+      <p:nvGrpSpPr>
+        <p:cNvPr id="1" name=""/>
+        <p:cNvGrpSpPr/>
+        <p:nvPr/>
+      </p:nvGrpSpPr>
+      <p:grpSpPr>
+        <a:xfrm>
+          <a:off x="0" y="0"/>
+          <a:ext cx="0" cy="0"/>
+          <a:chOff x="0" y="0"/>
+          <a:chExt cx="0" cy="0"/>
+        </a:xfrm>
+      </p:grpSpPr>
+      <p:sp>
+        <p:nvSpPr>
+          <p:cNvPr id="2" name="Content Placeholder 1"/>
+          <p:cNvSpPr>
+            <a:spLocks noGrp="1"/>
+          </p:cNvSpPr>
+          <p:nvPr>
+            <p:ph idx="1"/>
+          </p:nvPr>
+        </p:nvSpPr>
+        <p:spPr/>
+        <p:txBody>
+          <a:bodyPr/>
+          <a:lstStyle/>
+          <a:p>
+            <a:r>
+              <a:rPr lang="it-IT" b="1" dirty="0">
+                <a:solidFill>
+                  <a:srgbClr val="C00000"/>
+                </a:solidFill>
+              </a:rPr>
+              <a:t>Esercizio 1</a:t>
+            </a:r>
+            <a:r>
+              <a:rPr lang="it-IT" dirty="0"/>
+              <a:t>: scrivete un programma che, letti due numeri interi da terminale, restituisca il loro rapporto.</a:t>
+            </a:r>
+          </a:p>
+          <a:p>
+            <a:r>
+              <a:rPr lang="it-IT" b="1" dirty="0">
+                <a:solidFill>
+                  <a:srgbClr val="C00000"/>
+                </a:solidFill>
+              </a:rPr>
+              <a:t>Esercizio 2</a:t>
+            </a:r>
+            <a:r>
+              <a:rPr lang="it-IT" dirty="0"/>
+              <a:t>: Scrivere un programma che scrive a terminale la radice quadrata di 2, il cubo di 2 il seno di pigreco/4.</a:t>
+            </a:r>
+          </a:p>
+          <a:p>
+            <a:r>
+              <a:rPr lang="it-IT" b="1" dirty="0">
+                <a:solidFill>
+                  <a:srgbClr val="C00000"/>
+                </a:solidFill>
+              </a:rPr>
+              <a:t>Esercizio 3</a:t>
+            </a:r>
+            <a:r>
+              <a:rPr lang="it-IT" dirty="0"/>
+              <a:t>: Scrivere un programma che chieda all'utente di inserire un intero a scelta tra 1 e 2, e restituisca a terminale il valore inserito, o un messaggio di errore in caso di inserimento di altri interi.</a:t>
+            </a:r>
+          </a:p>
+          <a:p>
+            <a:r>
+              <a:rPr lang="it-IT" b="1" dirty="0">
+                <a:solidFill>
+                  <a:srgbClr val="C00000"/>
+                </a:solidFill>
+              </a:rPr>
+              <a:t>Esercizio 4</a:t>
+            </a:r>
+            <a:r>
+              <a:rPr lang="it-IT" dirty="0"/>
+              <a:t>: Scrivere un programma che, dato un array di n interi casuali, lo ordini dal piu piccolo al piu grande (suggerimento: create un array specificando voi alcuni numeri a caso per testare che l'ordinamento funzioni).</a:t>
+            </a:r>
+          </a:p>
+          <a:p>
+            <a:r>
+              <a:rPr lang="it-IT" b="1" dirty="0">
+                <a:solidFill>
+                  <a:srgbClr val="C00000"/>
+                </a:solidFill>
+              </a:rPr>
+              <a:t>Esercizio 5</a:t>
+            </a:r>
+            <a:r>
+              <a:rPr lang="it-IT" dirty="0"/>
+              <a:t>: Scrivere una funzione che calcoli il fattoriale di un numero intero non negativo.</a:t>
+            </a:r>
+          </a:p>
+          <a:p>
+            <a:r>
+              <a:rPr lang="it-IT" b="1" dirty="0">
+                <a:solidFill>
+                  <a:srgbClr val="C00000"/>
+                </a:solidFill>
+              </a:rPr>
+              <a:t>Esercizio 6</a:t>
+            </a:r>
+            <a:r>
+              <a:rPr lang="it-IT" dirty="0"/>
+              <a:t>: Scrivere la funzione fattoriale in modo ricorsivo, cioe facendo in modo che la funzione che calcola il fattoriale chiami se stessa.</a:t>
+            </a:r>
+          </a:p>
+          <a:p>
+            <a:r>
+              <a:rPr lang="it-IT" b="1" dirty="0">
+                <a:solidFill>
+                  <a:srgbClr val="C00000"/>
+                </a:solidFill>
+              </a:rPr>
+              <a:t>Esercizio 7</a:t>
+            </a:r>
+            <a:r>
+              <a:rPr lang="it-IT" b="1" dirty="0"/>
+              <a:t>: </a:t>
+            </a:r>
+            <a:r>
+              <a:rPr lang="it-IT" dirty="0"/>
+              <a:t>Scrivere un programma che, data una stringa, restituisca un conteggio delle lettere in essa presenti (si consiglia di usare un array con 26 posizioni, una per ogni lettera dell'alfabeto, inizializzato tutto a zeri scorrere la stringa e incrementare il contatore della lettera corrispondente).</a:t>
+            </a:r>
+            <a:endParaRPr lang="it-IT" dirty="0">
+              <a:latin typeface="Courier New" panose="02070309020205020404" pitchFamily="49" charset="0"/>
+              <a:cs typeface="Courier New" panose="02070309020205020404" pitchFamily="49" charset="0"/>
+            </a:endParaRPr>
+          </a:p>
+        </p:txBody>
+      </p:sp>
+      <p:sp>
+        <p:nvSpPr>
+          <p:cNvPr id="9" name="Title 2"/>
+          <p:cNvSpPr>
+            <a:spLocks noGrp="1"/>
+          </p:cNvSpPr>
+          <p:nvPr>
+            <p:ph type="title"/>
+          </p:nvPr>
+        </p:nvSpPr>
+        <p:spPr/>
+        <p:txBody>
+          <a:bodyPr/>
+          <a:lstStyle/>
+          <a:p>
+            <a:r>
+              <a:rPr lang="it-IT" dirty="0"/>
+              <a:t>Esercizi</a:t>
+            </a:r>
+            <a:endParaRPr lang="it-IT" sz="2800" dirty="0">
+              <a:effectLst/>
+            </a:endParaRPr>
+          </a:p>
+        </p:txBody>
+      </p:sp>
+      <p:sp>
+        <p:nvSpPr>
+          <p:cNvPr id="6" name="Slide Number Placeholder 4"/>
+          <p:cNvSpPr>
+            <a:spLocks noGrp="1"/>
+          </p:cNvSpPr>
+          <p:nvPr>
+            <p:ph type="sldNum" sz="quarter" idx="12"/>
+          </p:nvPr>
+        </p:nvSpPr>
+        <p:spPr>
+          <a:xfrm>
+            <a:off x="9027918" y="6590846"/>
+            <a:ext cx="855983" cy="143633"/>
+          </a:xfrm>
+        </p:spPr>
+        <p:txBody>
+          <a:bodyPr/>
+          <a:lstStyle/>
+          <a:p>
+            <a:fld id="{FB20157B-BF21-4976-810E-1ABA2FD4E36F}" type="slidenum">
+              <a:rPr lang="it-IT" smtClean="0"/>
+              <a:pPr/>
+              <a:t>15</a:t>
+            </a:fld>
+            <a:endParaRPr lang="it-IT"/>
+          </a:p>
+        </p:txBody>
+      </p:sp>
+    </p:spTree>
+    <p:extLst>
+      <p:ext uri="{BB962C8B-B14F-4D97-AF65-F5344CB8AC3E}">
+        <p14:creationId xmlns:p14="http://schemas.microsoft.com/office/powerpoint/2010/main" val="3921910409"/>
+      </p:ext>
+    </p:extLst>
+  </p:cSld>
+  <p:clrMapOvr>
+    <a:masterClrMapping/>
+  </p:clrMapOvr>
+</p:sld>
+</file>
+
+<file path=ppt/slides/slide16.xml><?xml version="1.0" encoding="utf-8"?>
+<p:sld xmlns:a="http://schemas.openxmlformats.org/drawingml/2006/main" xmlns:r="http://schemas.openxmlformats.org/officeDocument/2006/relationships" xmlns:p="http://schemas.openxmlformats.org/presentationml/2006/main">
+  <p:cSld>
+    <p:spTree>
+      <p:nvGrpSpPr>
+        <p:cNvPr id="1" name=""/>
+        <p:cNvGrpSpPr/>
+        <p:nvPr/>
+      </p:nvGrpSpPr>
+      <p:grpSpPr>
+        <a:xfrm>
+          <a:off x="0" y="0"/>
+          <a:ext cx="0" cy="0"/>
+          <a:chOff x="0" y="0"/>
+          <a:chExt cx="0" cy="0"/>
+        </a:xfrm>
+      </p:grpSpPr>
+      <p:sp>
+        <p:nvSpPr>
+          <p:cNvPr id="9" name="Title 2"/>
+          <p:cNvSpPr>
+            <a:spLocks noGrp="1"/>
+          </p:cNvSpPr>
+          <p:nvPr>
+            <p:ph type="title"/>
+          </p:nvPr>
+        </p:nvSpPr>
+        <p:spPr/>
+        <p:txBody>
+          <a:bodyPr/>
+          <a:lstStyle/>
+          <a:p>
+            <a:r>
+              <a:rPr lang="it-IT" dirty="0"/>
+              <a:t>Soluzioni?</a:t>
+            </a:r>
+            <a:endParaRPr lang="it-IT" sz="2800" dirty="0">
+              <a:effectLst/>
+            </a:endParaRPr>
+          </a:p>
+        </p:txBody>
+      </p:sp>
+      <p:sp>
+        <p:nvSpPr>
+          <p:cNvPr id="6" name="Slide Number Placeholder 4"/>
+          <p:cNvSpPr>
+            <a:spLocks noGrp="1"/>
+          </p:cNvSpPr>
+          <p:nvPr>
+            <p:ph type="sldNum" sz="quarter" idx="12"/>
+          </p:nvPr>
+        </p:nvSpPr>
+        <p:spPr>
+          <a:xfrm>
+            <a:off x="9027918" y="6590846"/>
+            <a:ext cx="855983" cy="143633"/>
+          </a:xfrm>
+        </p:spPr>
+        <p:txBody>
+          <a:bodyPr/>
+          <a:lstStyle/>
+          <a:p>
+            <a:fld id="{FB20157B-BF21-4976-810E-1ABA2FD4E36F}" type="slidenum">
+              <a:rPr lang="it-IT" smtClean="0"/>
+              <a:pPr/>
+              <a:t>16</a:t>
+            </a:fld>
+            <a:endParaRPr lang="it-IT"/>
+          </a:p>
+        </p:txBody>
+      </p:sp>
       <p:sp>
         <p:nvSpPr>
           <p:cNvPr id="8" name="Content Placeholder 1"/>
@@ -3089,11 +3730,6 @@
               </a:rPr>
               <a:t>	https://github.com/RetiSpA/Esercizi-ITS</a:t>
             </a:r>
-            <a:endParaRPr lang="it-IT" sz="2400" b="1" dirty="0">
-              <a:solidFill>
-                <a:srgbClr val="C00000"/>
-              </a:solidFill>
-            </a:endParaRPr>
           </a:p>
         </p:txBody>
       </p:sp>
@@ -3975,111 +4611,176 @@
                   <a:srgbClr val="C00000"/>
                 </a:solidFill>
               </a:rPr>
-              <a:t>Caratteristiche interne</a:t>
-            </a:r>
-            <a:endParaRPr lang="it-IT" dirty="0">
-              <a:solidFill>
-                <a:srgbClr val="C00000"/>
-              </a:solidFill>
-            </a:endParaRPr>
-          </a:p>
-          <a:p>
-            <a:pPr lvl="1"/>
-            <a:r>
-              <a:rPr lang="it-IT" sz="1400" b="1" dirty="0"/>
-              <a:t>Espressività/Leggibilità</a:t>
-            </a:r>
-            <a:r>
-              <a:rPr lang="it-IT" sz="1400" dirty="0"/>
-              <a:t>: facilità e semplicità con cui si può scrivere e leggere un dato algoritmo</a:t>
-            </a:r>
-          </a:p>
-          <a:p>
-            <a:pPr lvl="1"/>
-            <a:r>
-              <a:rPr lang="it-IT" sz="1400" b="1" dirty="0"/>
-              <a:t>Robustezza:</a:t>
-            </a:r>
-            <a:r>
-              <a:rPr lang="it-IT" sz="1400" dirty="0"/>
-              <a:t> capacità del linguaggio di prevenire, nei limiti del possibile, gli errori di programmazione.</a:t>
-            </a:r>
-          </a:p>
-          <a:p>
-            <a:pPr lvl="1"/>
-            <a:r>
-              <a:rPr lang="it-IT" sz="1400" b="1" dirty="0"/>
-              <a:t>Modularità/Flessibilità:</a:t>
-            </a:r>
-            <a:r>
-              <a:rPr lang="it-IT" sz="1400" dirty="0"/>
-              <a:t> possibilità di creare modulo ed estendere il linguaggio.</a:t>
-            </a:r>
-          </a:p>
-          <a:p>
-            <a:pPr lvl="1"/>
-            <a:r>
-              <a:rPr lang="it-IT" sz="1400" b="1" dirty="0"/>
-              <a:t>Efficienza:</a:t>
-            </a:r>
-            <a:r>
-              <a:rPr lang="it-IT" sz="1400" dirty="0"/>
-              <a:t> la velocità di esecuzione e l'uso oculato delle risorse del sistema su cui il programma finito gira.</a:t>
-            </a:r>
-          </a:p>
-          <a:p>
-            <a:pPr marL="601150" lvl="1" indent="0">
+              <a:t>Linguaggi imperativi e strutturato - C</a:t>
+            </a:r>
+            <a:br>
+              <a:rPr lang="it-IT" dirty="0"/>
+            </a:br>
+            <a:endParaRPr lang="it-IT" dirty="0"/>
+          </a:p>
+          <a:p>
+            <a:pPr marL="717550" indent="0">
               <a:buNone/>
             </a:pPr>
-            <a:endParaRPr lang="it-IT" sz="1400" dirty="0"/>
-          </a:p>
-          <a:p>
-            <a:r>
-              <a:rPr lang="it-IT" b="1" dirty="0">
-                <a:solidFill>
-                  <a:srgbClr val="C00000"/>
-                </a:solidFill>
-              </a:rPr>
-              <a:t>Caratteristiche esterne</a:t>
-            </a:r>
-            <a:endParaRPr lang="it-IT" dirty="0">
-              <a:solidFill>
-                <a:srgbClr val="C00000"/>
-              </a:solidFill>
+            <a:r>
+              <a:rPr lang="it-IT" sz="1400" dirty="0">
+                <a:latin typeface="Courier New" panose="02070309020205020404" pitchFamily="49" charset="0"/>
+                <a:cs typeface="Courier New" panose="02070309020205020404" pitchFamily="49" charset="0"/>
+              </a:rPr>
+              <a:t>double media(int[] array) {</a:t>
+            </a:r>
+          </a:p>
+          <a:p>
+            <a:pPr marL="717550" indent="0">
+              <a:buNone/>
+            </a:pPr>
+            <a:r>
+              <a:rPr lang="it-IT" sz="1400" dirty="0">
+                <a:latin typeface="Courier New" panose="02070309020205020404" pitchFamily="49" charset="0"/>
+                <a:cs typeface="Courier New" panose="02070309020205020404" pitchFamily="49" charset="0"/>
+              </a:rPr>
+              <a:t>	double risultato = 0;</a:t>
+            </a:r>
+          </a:p>
+          <a:p>
+            <a:pPr marL="717550" indent="0">
+              <a:buNone/>
+            </a:pPr>
+            <a:r>
+              <a:rPr lang="it-IT" sz="1400" dirty="0">
+                <a:latin typeface="Courier New" panose="02070309020205020404" pitchFamily="49" charset="0"/>
+                <a:cs typeface="Courier New" panose="02070309020205020404" pitchFamily="49" charset="0"/>
+              </a:rPr>
+              <a:t>	int length = 0;</a:t>
+            </a:r>
+          </a:p>
+          <a:p>
+            <a:pPr marL="717550" indent="0">
+              <a:buNone/>
+            </a:pPr>
+            <a:r>
+              <a:rPr lang="it-IT" sz="1400" dirty="0">
+                <a:latin typeface="Courier New" panose="02070309020205020404" pitchFamily="49" charset="0"/>
+                <a:cs typeface="Courier New" panose="02070309020205020404" pitchFamily="49" charset="0"/>
+              </a:rPr>
+              <a:t>	while (array[length] &gt; 0) {</a:t>
+            </a:r>
+          </a:p>
+          <a:p>
+            <a:pPr marL="717550" indent="0">
+              <a:buNone/>
+            </a:pPr>
+            <a:r>
+              <a:rPr lang="it-IT" sz="1400" dirty="0">
+                <a:latin typeface="Courier New" panose="02070309020205020404" pitchFamily="49" charset="0"/>
+                <a:cs typeface="Courier New" panose="02070309020205020404" pitchFamily="49" charset="0"/>
+              </a:rPr>
+              <a:t>		</a:t>
+            </a:r>
+            <a:r>
+              <a:rPr lang="it-IT" sz="1400" b="1" dirty="0">
+                <a:latin typeface="Courier New" panose="02070309020205020404" pitchFamily="49" charset="0"/>
+                <a:cs typeface="Courier New" panose="02070309020205020404" pitchFamily="49" charset="0"/>
+              </a:rPr>
+              <a:t>risultato += array[length];</a:t>
+            </a:r>
+          </a:p>
+          <a:p>
+            <a:pPr marL="717550" indent="0">
+              <a:buNone/>
+            </a:pPr>
+            <a:r>
+              <a:rPr lang="it-IT" sz="1400" dirty="0">
+                <a:latin typeface="Courier New" panose="02070309020205020404" pitchFamily="49" charset="0"/>
+                <a:cs typeface="Courier New" panose="02070309020205020404" pitchFamily="49" charset="0"/>
+              </a:rPr>
+              <a:t>		length++;</a:t>
+            </a:r>
+          </a:p>
+          <a:p>
+            <a:pPr marL="717550" indent="0">
+              <a:buNone/>
+            </a:pPr>
+            <a:r>
+              <a:rPr lang="it-IT" sz="1400" dirty="0">
+                <a:latin typeface="Courier New" panose="02070309020205020404" pitchFamily="49" charset="0"/>
+                <a:cs typeface="Courier New" panose="02070309020205020404" pitchFamily="49" charset="0"/>
+              </a:rPr>
+              <a:t>	}</a:t>
+            </a:r>
+          </a:p>
+          <a:p>
+            <a:pPr marL="717550" indent="0">
+              <a:buNone/>
+            </a:pPr>
+            <a:r>
+              <a:rPr lang="it-IT" sz="1400" b="1" dirty="0">
+                <a:latin typeface="Courier New" panose="02070309020205020404" pitchFamily="49" charset="0"/>
+                <a:cs typeface="Courier New" panose="02070309020205020404" pitchFamily="49" charset="0"/>
+              </a:rPr>
+              <a:t>	risultato /= length;</a:t>
+            </a:r>
+          </a:p>
+          <a:p>
+            <a:pPr marL="717550" indent="0">
+              <a:buNone/>
+            </a:pPr>
+            <a:r>
+              <a:rPr lang="it-IT" sz="1400" dirty="0">
+                <a:latin typeface="Courier New" panose="02070309020205020404" pitchFamily="49" charset="0"/>
+                <a:cs typeface="Courier New" panose="02070309020205020404" pitchFamily="49" charset="0"/>
+              </a:rPr>
+              <a:t>	return risultato;</a:t>
+            </a:r>
+          </a:p>
+          <a:p>
+            <a:pPr marL="717550" indent="0">
+              <a:buNone/>
+            </a:pPr>
+            <a:r>
+              <a:rPr lang="it-IT" sz="1400" dirty="0">
+                <a:latin typeface="Courier New" panose="02070309020205020404" pitchFamily="49" charset="0"/>
+                <a:cs typeface="Courier New" panose="02070309020205020404" pitchFamily="49" charset="0"/>
+              </a:rPr>
+              <a:t>}</a:t>
+            </a:r>
+          </a:p>
+          <a:p>
+            <a:pPr marL="717550" indent="0">
+              <a:buNone/>
+            </a:pPr>
+            <a:endParaRPr lang="it-IT" sz="1400" dirty="0">
+              <a:latin typeface="Courier New" panose="02070309020205020404" pitchFamily="49" charset="0"/>
+              <a:cs typeface="Courier New" panose="02070309020205020404" pitchFamily="49" charset="0"/>
             </a:endParaRPr>
           </a:p>
           <a:p>
-            <a:pPr lvl="1"/>
-            <a:r>
-              <a:rPr lang="it-IT" sz="1400" b="1" dirty="0"/>
-              <a:t>Diffusione:</a:t>
-            </a:r>
-            <a:r>
-              <a:rPr lang="it-IT" sz="1400" dirty="0"/>
-              <a:t> livello di utilizzo del linguaggio nelle varie comunità.</a:t>
-            </a:r>
-          </a:p>
-          <a:p>
-            <a:pPr lvl="1"/>
-            <a:r>
-              <a:rPr lang="it-IT" sz="1400" b="1" dirty="0"/>
-              <a:t>Standardizzazione:</a:t>
-            </a:r>
-            <a:r>
-              <a:rPr lang="it-IT" sz="1400" dirty="0"/>
-              <a:t> livello di uniformità del linguaggio.</a:t>
-            </a:r>
-          </a:p>
-          <a:p>
-            <a:pPr lvl="1"/>
-            <a:r>
-              <a:rPr lang="it-IT" sz="1400" b="1" dirty="0"/>
-              <a:t>Portabilità:</a:t>
-            </a:r>
-            <a:r>
-              <a:rPr lang="it-IT" sz="1400" dirty="0"/>
-              <a:t> possibilità di portare il codice scritto su una certa piattaforma (CPU + architettura + sistema operativo) su un'altra</a:t>
-            </a:r>
+            <a:pPr marL="717550" indent="0">
+              <a:buNone/>
+            </a:pPr>
+            <a:r>
+              <a:rPr lang="it-IT" sz="1400" dirty="0">
+                <a:latin typeface="Courier New" panose="02070309020205020404" pitchFamily="49" charset="0"/>
+                <a:cs typeface="Courier New" panose="02070309020205020404" pitchFamily="49" charset="0"/>
+              </a:rPr>
+              <a:t>int array[5] = { 1, 2, 3, 4, -1 };</a:t>
+            </a:r>
+          </a:p>
+          <a:p>
+            <a:pPr marL="717550" indent="0">
+              <a:buNone/>
+            </a:pPr>
+            <a:r>
+              <a:rPr lang="it-IT" sz="1400" dirty="0">
+                <a:latin typeface="Courier New" panose="02070309020205020404" pitchFamily="49" charset="0"/>
+                <a:cs typeface="Courier New" panose="02070309020205020404" pitchFamily="49" charset="0"/>
+              </a:rPr>
+              <a:t>dobule risultato = media(array);</a:t>
+            </a:r>
+            <a:endParaRPr lang="it-IT" sz="1400" dirty="0">
+              <a:latin typeface="Courier New" panose="02070309020205020404" pitchFamily="49" charset="0"/>
+              <a:cs typeface="Courier New" panose="02070309020205020404" pitchFamily="49" charset="0"/>
+            </a:endParaRPr>
           </a:p>
         </p:txBody>
       </p:sp>
@@ -4126,7 +4827,94 @@
               <a:rPr lang="it-IT" sz="3600" dirty="0">
                 <a:latin typeface="Calibri" panose="020F0502020204030204" pitchFamily="34" charset="0"/>
               </a:rPr>
-              <a:t>Perchè tanti linguaggi diversi?</a:t>
+              <a:t>Media dei valori di una lista</a:t>
+            </a:r>
+          </a:p>
+        </p:txBody>
+      </p:sp>
+      <p:sp>
+        <p:nvSpPr>
+          <p:cNvPr id="3" name="Callout: Line 2"/>
+          <p:cNvSpPr/>
+          <p:nvPr/>
+        </p:nvSpPr>
+        <p:spPr>
+          <a:xfrm>
+            <a:off x="6516489" y="3852317"/>
+            <a:ext cx="5040560" cy="1440160"/>
+          </a:xfrm>
+          <a:prstGeom prst="borderCallout1">
+            <a:avLst>
+              <a:gd name="adj1" fmla="val 18750"/>
+              <a:gd name="adj2" fmla="val -8333"/>
+              <a:gd name="adj3" fmla="val -40975"/>
+              <a:gd name="adj4" fmla="val -33801"/>
+            </a:avLst>
+          </a:prstGeom>
+          <a:noFill/>
+          <a:ln>
+            <a:solidFill>
+              <a:srgbClr val="C00000"/>
+            </a:solidFill>
+          </a:ln>
+        </p:spPr>
+        <p:style>
+          <a:lnRef idx="2">
+            <a:schemeClr val="accent1">
+              <a:shade val="50000"/>
+            </a:schemeClr>
+          </a:lnRef>
+          <a:fillRef idx="1">
+            <a:schemeClr val="accent1"/>
+          </a:fillRef>
+          <a:effectRef idx="0">
+            <a:schemeClr val="accent1"/>
+          </a:effectRef>
+          <a:fontRef idx="minor">
+            <a:schemeClr val="lt1"/>
+          </a:fontRef>
+        </p:style>
+        <p:txBody>
+          <a:bodyPr rtlCol="0" anchor="ctr"/>
+          <a:lstStyle/>
+          <a:p>
+            <a:r>
+              <a:rPr lang="it-IT" sz="1600" dirty="0">
+                <a:solidFill>
+                  <a:schemeClr val="tx1"/>
+                </a:solidFill>
+              </a:rPr>
+              <a:t>Scorro tutto l’array e: sommo tutti gli elementi tra loro.</a:t>
+            </a:r>
+            <a:br>
+              <a:rPr lang="it-IT" sz="1600" dirty="0">
+                <a:solidFill>
+                  <a:schemeClr val="tx1"/>
+                </a:solidFill>
+              </a:rPr>
+            </a:br>
+            <a:r>
+              <a:rPr lang="it-IT" sz="1600" dirty="0">
+                <a:solidFill>
+                  <a:schemeClr val="tx1"/>
+                </a:solidFill>
+              </a:rPr>
+              <a:t>Al termine del ciclo length conterrà il numero totale di elementi.</a:t>
+            </a:r>
+            <a:br>
+              <a:rPr lang="it-IT" sz="1600" dirty="0">
+                <a:solidFill>
+                  <a:schemeClr val="tx1"/>
+                </a:solidFill>
+              </a:rPr>
+            </a:br>
+            <a:r>
+              <a:rPr lang="it-IT" sz="1600" dirty="0">
+                <a:solidFill>
+                  <a:schemeClr val="tx1"/>
+                </a:solidFill>
+              </a:rPr>
+              <a:t>La media quindi è la somma diviso il numero di elementi.</a:t>
             </a:r>
           </a:p>
         </p:txBody>
@@ -4134,7 +4922,7 @@
     </p:spTree>
     <p:extLst>
       <p:ext uri="{BB962C8B-B14F-4D97-AF65-F5344CB8AC3E}">
-        <p14:creationId xmlns:p14="http://schemas.microsoft.com/office/powerpoint/2010/main" val="2474470146"/>
+        <p14:creationId xmlns:p14="http://schemas.microsoft.com/office/powerpoint/2010/main" val="3745607122"/>
       </p:ext>
     </p:extLst>
   </p:cSld>
@@ -4171,129 +4959,185 @@
             <p:ph idx="1"/>
           </p:nvPr>
         </p:nvSpPr>
-        <p:spPr>
-          <a:xfrm>
-            <a:off x="5796409" y="1476053"/>
-            <a:ext cx="5490399" cy="3960440"/>
-          </a:xfrm>
-        </p:spPr>
+        <p:spPr/>
         <p:txBody>
           <a:bodyPr/>
           <a:lstStyle/>
           <a:p>
             <a:r>
-              <a:rPr lang="it-IT" dirty="0"/>
-              <a:t>La trasformazione dei sorgenti in un programma eseguibile avviene in due fasi: </a:t>
-            </a:r>
-          </a:p>
-          <a:p>
-            <a:pPr lvl="1"/>
-            <a:r>
-              <a:rPr lang="it-IT" sz="1400" b="1" dirty="0">
+              <a:rPr lang="it-IT" b="1" dirty="0">
                 <a:solidFill>
                   <a:srgbClr val="C00000"/>
                 </a:solidFill>
               </a:rPr>
-              <a:t>compilazione</a:t>
-            </a:r>
-            <a:r>
-              <a:rPr lang="it-IT" sz="1400" dirty="0"/>
-              <a:t>, e</a:t>
-            </a:r>
-          </a:p>
-          <a:p>
-            <a:pPr lvl="1"/>
-            <a:r>
-              <a:rPr lang="it-IT" sz="1400" b="1" dirty="0">
-                <a:solidFill>
-                  <a:srgbClr val="C00000"/>
-                </a:solidFill>
-              </a:rPr>
-              <a:t>linking</a:t>
-            </a:r>
+              <a:t>Linguaggi funzionali – LISP</a:t>
+            </a:r>
+          </a:p>
+          <a:p>
+            <a:endParaRPr lang="it-IT" dirty="0"/>
+          </a:p>
+          <a:p>
+            <a:pPr marL="717550" indent="0">
+              <a:buNone/>
+            </a:pPr>
+            <a:r>
+              <a:rPr lang="it-IT" dirty="0">
+                <a:latin typeface="Courier New" panose="02070309020205020404" pitchFamily="49" charset="0"/>
+                <a:cs typeface="Courier New" panose="02070309020205020404" pitchFamily="49" charset="0"/>
+              </a:rPr>
+              <a:t>(defun somma (lista)</a:t>
+            </a:r>
+          </a:p>
+          <a:p>
+            <a:pPr marL="717550" indent="0">
+              <a:buNone/>
+            </a:pPr>
+            <a:r>
+              <a:rPr lang="it-IT" dirty="0">
+                <a:latin typeface="Courier New" panose="02070309020205020404" pitchFamily="49" charset="0"/>
+                <a:cs typeface="Courier New" panose="02070309020205020404" pitchFamily="49" charset="0"/>
+              </a:rPr>
+              <a:t>(cond</a:t>
+            </a:r>
+          </a:p>
+          <a:p>
+            <a:pPr marL="717550" indent="0">
+              <a:buNone/>
+            </a:pPr>
+            <a:r>
+              <a:rPr lang="it-IT" dirty="0">
+                <a:latin typeface="Courier New" panose="02070309020205020404" pitchFamily="49" charset="0"/>
+                <a:cs typeface="Courier New" panose="02070309020205020404" pitchFamily="49" charset="0"/>
+              </a:rPr>
+              <a:t> ((null lista) 0)</a:t>
+            </a:r>
+          </a:p>
+          <a:p>
+            <a:pPr marL="717550" indent="0">
+              <a:buNone/>
+            </a:pPr>
+            <a:r>
+              <a:rPr lang="it-IT" b="1" dirty="0">
+                <a:latin typeface="Courier New" panose="02070309020205020404" pitchFamily="49" charset="0"/>
+                <a:cs typeface="Courier New" panose="02070309020205020404" pitchFamily="49" charset="0"/>
+              </a:rPr>
+              <a:t> (T (+ (first lista) (somma (rest lista))))</a:t>
+            </a:r>
+          </a:p>
+          <a:p>
+            <a:pPr marL="717550" indent="0">
+              <a:buNone/>
+            </a:pPr>
+            <a:r>
+              <a:rPr lang="it-IT" dirty="0">
+                <a:latin typeface="Courier New" panose="02070309020205020404" pitchFamily="49" charset="0"/>
+                <a:cs typeface="Courier New" panose="02070309020205020404" pitchFamily="49" charset="0"/>
+              </a:rPr>
+              <a:t>))</a:t>
+            </a:r>
+          </a:p>
+          <a:p>
+            <a:pPr marL="717550" indent="0">
+              <a:buNone/>
+            </a:pPr>
             <a:br>
-              <a:rPr lang="it-IT" dirty="0"/>
+              <a:rPr lang="it-IT" dirty="0">
+                <a:latin typeface="Courier New" panose="02070309020205020404" pitchFamily="49" charset="0"/>
+                <a:cs typeface="Courier New" panose="02070309020205020404" pitchFamily="49" charset="0"/>
+              </a:rPr>
             </a:br>
-            <a:endParaRPr lang="it-IT" dirty="0"/>
-          </a:p>
-          <a:p>
-            <a:r>
-              <a:rPr lang="it-IT" dirty="0"/>
-              <a:t>Nel linking possono essere "collegate" </a:t>
-            </a:r>
+            <a:endParaRPr lang="it-IT" dirty="0">
+              <a:latin typeface="Courier New" panose="02070309020205020404" pitchFamily="49" charset="0"/>
+              <a:cs typeface="Courier New" panose="02070309020205020404" pitchFamily="49" charset="0"/>
+            </a:endParaRPr>
+          </a:p>
+          <a:p>
+            <a:pPr marL="717550" indent="0">
+              <a:buNone/>
+            </a:pPr>
+            <a:r>
+              <a:rPr lang="it-IT" dirty="0">
+                <a:latin typeface="Courier New" panose="02070309020205020404" pitchFamily="49" charset="0"/>
+                <a:cs typeface="Courier New" panose="02070309020205020404" pitchFamily="49" charset="0"/>
+              </a:rPr>
+              <a:t>(defun media (lista)</a:t>
+            </a:r>
+          </a:p>
+          <a:p>
+            <a:pPr marL="717550" indent="0">
+              <a:buNone/>
+            </a:pPr>
+            <a:r>
+              <a:rPr lang="it-IT" dirty="0">
+                <a:latin typeface="Courier New" panose="02070309020205020404" pitchFamily="49" charset="0"/>
+                <a:cs typeface="Courier New" panose="02070309020205020404" pitchFamily="49" charset="0"/>
+              </a:rPr>
+              <a:t>(cond</a:t>
+            </a:r>
+          </a:p>
+          <a:p>
+            <a:pPr marL="717550" indent="0">
+              <a:buNone/>
+            </a:pPr>
+            <a:r>
+              <a:rPr lang="it-IT" dirty="0">
+                <a:latin typeface="Courier New" panose="02070309020205020404" pitchFamily="49" charset="0"/>
+                <a:cs typeface="Courier New" panose="02070309020205020404" pitchFamily="49" charset="0"/>
+              </a:rPr>
+              <a:t> ((null lista) 0)</a:t>
+            </a:r>
+          </a:p>
+          <a:p>
+            <a:pPr marL="717550" indent="0">
+              <a:buNone/>
+            </a:pPr>
             <a:r>
               <a:rPr lang="it-IT" b="1" dirty="0">
-                <a:solidFill>
-                  <a:srgbClr val="C00000"/>
-                </a:solidFill>
-              </a:rPr>
-              <a:t>librerie</a:t>
-            </a:r>
+                <a:latin typeface="Courier New" panose="02070309020205020404" pitchFamily="49" charset="0"/>
+                <a:cs typeface="Courier New" panose="02070309020205020404" pitchFamily="49" charset="0"/>
+              </a:rPr>
+              <a:t> (T (/ (somma lista) (length lista)))</a:t>
+            </a:r>
+          </a:p>
+          <a:p>
+            <a:pPr marL="717550" indent="0">
+              <a:buNone/>
+            </a:pPr>
             <a:r>
               <a:rPr lang="it-IT" dirty="0">
-                <a:solidFill>
-                  <a:srgbClr val="C00000"/>
-                </a:solidFill>
-              </a:rPr>
-              <a:t> </a:t>
-            </a:r>
-            <a:r>
-              <a:rPr lang="it-IT" b="1" dirty="0">
-                <a:solidFill>
-                  <a:srgbClr val="C00000"/>
-                </a:solidFill>
-              </a:rPr>
-              <a:t>esterne</a:t>
-            </a:r>
-            <a:r>
-              <a:rPr lang="it-IT" dirty="0"/>
-              <a:t> che vengono incluse nell'eseguibile prodotto.</a:t>
-            </a:r>
+                <a:latin typeface="Courier New" panose="02070309020205020404" pitchFamily="49" charset="0"/>
+                <a:cs typeface="Courier New" panose="02070309020205020404" pitchFamily="49" charset="0"/>
+              </a:rPr>
+              <a:t>))</a:t>
+            </a:r>
+          </a:p>
+          <a:p>
+            <a:pPr marL="717550" indent="0">
+              <a:buNone/>
+            </a:pPr>
             <a:br>
-              <a:rPr lang="it-IT" dirty="0"/>
+              <a:rPr lang="it-IT" dirty="0">
+                <a:latin typeface="Courier New" panose="02070309020205020404" pitchFamily="49" charset="0"/>
+                <a:cs typeface="Courier New" panose="02070309020205020404" pitchFamily="49" charset="0"/>
+              </a:rPr>
             </a:br>
-            <a:endParaRPr lang="it-IT" dirty="0"/>
-          </a:p>
-          <a:p>
-            <a:r>
-              <a:rPr lang="it-IT" dirty="0"/>
-              <a:t>Il risultato della compilazione è un eseguibile scritto in </a:t>
-            </a:r>
-            <a:r>
-              <a:rPr lang="it-IT" b="1" dirty="0">
-                <a:solidFill>
-                  <a:srgbClr val="C00000"/>
-                </a:solidFill>
-              </a:rPr>
-              <a:t>codice macchina</a:t>
-            </a:r>
+            <a:endParaRPr lang="it-IT" dirty="0">
+              <a:latin typeface="Courier New" panose="02070309020205020404" pitchFamily="49" charset="0"/>
+              <a:cs typeface="Courier New" panose="02070309020205020404" pitchFamily="49" charset="0"/>
+            </a:endParaRPr>
+          </a:p>
+          <a:p>
+            <a:pPr marL="717550" indent="0">
+              <a:buNone/>
+            </a:pPr>
             <a:r>
               <a:rPr lang="it-IT" dirty="0">
-                <a:solidFill>
-                  <a:srgbClr val="C00000"/>
-                </a:solidFill>
-              </a:rPr>
-              <a:t> </a:t>
-            </a:r>
-            <a:r>
-              <a:rPr lang="it-IT" dirty="0"/>
-              <a:t>(il programma può essere eseguito solo sul processore e il sistema operativo per cui è stato compilato).</a:t>
-            </a:r>
-          </a:p>
-          <a:p>
-            <a:pPr lvl="1"/>
-            <a:r>
-              <a:rPr lang="it-IT" sz="1400" dirty="0"/>
-              <a:t>è comunque possibile fare </a:t>
-            </a:r>
-            <a:r>
-              <a:rPr lang="it-IT" sz="1400" i="1" dirty="0"/>
-              <a:t>cross compilation </a:t>
-            </a:r>
-            <a:r>
-              <a:rPr lang="it-IT" sz="1400" dirty="0"/>
-              <a:t>(cioè compilare per architetture differenti!)</a:t>
-            </a:r>
+                <a:latin typeface="Courier New" panose="02070309020205020404" pitchFamily="49" charset="0"/>
+                <a:cs typeface="Courier New" panose="02070309020205020404" pitchFamily="49" charset="0"/>
+              </a:rPr>
+              <a:t>(media (list 1 2 3 4))</a:t>
+            </a:r>
+            <a:endParaRPr lang="it-IT" sz="1400" dirty="0"/>
           </a:p>
         </p:txBody>
       </p:sp>
@@ -4340,56 +5184,144 @@
               <a:rPr lang="it-IT" sz="3600" dirty="0">
                 <a:latin typeface="Calibri" panose="020F0502020204030204" pitchFamily="34" charset="0"/>
               </a:rPr>
-              <a:t>Il processo di compilazione</a:t>
+              <a:t>Media dei valori di una lista</a:t>
             </a:r>
           </a:p>
         </p:txBody>
       </p:sp>
-      <p:pic>
-        <p:nvPicPr>
-          <p:cNvPr id="3074" name="Picture 2" descr="https://lh3.googleusercontent.com/Cu1aUc0Xs_sPr71olaQ1u_XxejkIQFB3IARcpbCJ0BTwkGNHizLGncnw__AkzT-pkXDzWHe2BbE8I40w1oTFu6GTfO9p2EHwL6Fd2MRO2TXAwL0FIyN-kQrCOHlOS3_uztxd0BjxO6sdHW8"/>
-          <p:cNvPicPr>
-            <a:picLocks noChangeAspect="1" noChangeArrowheads="1"/>
-          </p:cNvPicPr>
+      <p:sp>
+        <p:nvSpPr>
+          <p:cNvPr id="7" name="Callout: Line 6"/>
+          <p:cNvSpPr/>
           <p:nvPr/>
-        </p:nvPicPr>
-        <p:blipFill>
-          <a:blip r:embed="rId2">
-            <a:extLst>
-              <a:ext uri="{28A0092B-C50C-407E-A947-70E740481C1C}">
-                <a14:useLocalDpi xmlns:a14="http://schemas.microsoft.com/office/drawing/2010/main" val="0"/>
-              </a:ext>
-            </a:extLst>
-          </a:blip>
-          <a:srcRect/>
-          <a:stretch>
-            <a:fillRect/>
-          </a:stretch>
-        </p:blipFill>
-        <p:spPr bwMode="auto">
+        </p:nvSpPr>
+        <p:spPr>
           <a:xfrm>
-            <a:off x="179785" y="1316607"/>
-            <a:ext cx="5616624" cy="4551934"/>
+            <a:off x="6507638" y="5174179"/>
+            <a:ext cx="5040560" cy="912546"/>
           </a:xfrm>
-          <a:prstGeom prst="rect">
-            <a:avLst/>
+          <a:prstGeom prst="borderCallout1">
+            <a:avLst>
+              <a:gd name="adj1" fmla="val 18750"/>
+              <a:gd name="adj2" fmla="val -8333"/>
+              <a:gd name="adj3" fmla="val -27179"/>
+              <a:gd name="adj4" fmla="val -37977"/>
+            </a:avLst>
           </a:prstGeom>
           <a:noFill/>
-          <a:extLst>
-            <a:ext uri="{909E8E84-426E-40DD-AFC4-6F175D3DCCD1}">
-              <a14:hiddenFill xmlns:a14="http://schemas.microsoft.com/office/drawing/2010/main">
-                <a:solidFill>
-                  <a:srgbClr val="FFFFFF"/>
-                </a:solidFill>
-              </a14:hiddenFill>
-            </a:ext>
-          </a:extLst>
+          <a:ln>
+            <a:solidFill>
+              <a:srgbClr val="C00000"/>
+            </a:solidFill>
+          </a:ln>
         </p:spPr>
-      </p:pic>
+        <p:style>
+          <a:lnRef idx="2">
+            <a:schemeClr val="accent1">
+              <a:shade val="50000"/>
+            </a:schemeClr>
+          </a:lnRef>
+          <a:fillRef idx="1">
+            <a:schemeClr val="accent1"/>
+          </a:fillRef>
+          <a:effectRef idx="0">
+            <a:schemeClr val="accent1"/>
+          </a:effectRef>
+          <a:fontRef idx="minor">
+            <a:schemeClr val="lt1"/>
+          </a:fontRef>
+        </p:style>
+        <p:txBody>
+          <a:bodyPr rtlCol="0" anchor="ctr"/>
+          <a:lstStyle/>
+          <a:p>
+            <a:r>
+              <a:rPr lang="it-IT" sz="1600" dirty="0">
+                <a:solidFill>
+                  <a:schemeClr val="tx1"/>
+                </a:solidFill>
+              </a:rPr>
+              <a:t>Il risultato (la media) è definita come rapporto tra la somma e la lunghezza della lista.</a:t>
+            </a:r>
+            <a:br>
+              <a:rPr lang="it-IT" sz="1600" dirty="0">
+                <a:solidFill>
+                  <a:schemeClr val="tx1"/>
+                </a:solidFill>
+              </a:rPr>
+            </a:br>
+            <a:r>
+              <a:rPr lang="it-IT" sz="1600" dirty="0">
+                <a:solidFill>
+                  <a:schemeClr val="tx1"/>
+                </a:solidFill>
+              </a:rPr>
+              <a:t>L’operatore length è già definito dal linguaggio.</a:t>
+            </a:r>
+          </a:p>
+        </p:txBody>
+      </p:sp>
+      <p:sp>
+        <p:nvSpPr>
+          <p:cNvPr id="8" name="Callout: Line 7"/>
+          <p:cNvSpPr/>
+          <p:nvPr/>
+        </p:nvSpPr>
+        <p:spPr>
+          <a:xfrm>
+            <a:off x="6660505" y="1315978"/>
+            <a:ext cx="5040560" cy="1152128"/>
+          </a:xfrm>
+          <a:prstGeom prst="borderCallout1">
+            <a:avLst>
+              <a:gd name="adj1" fmla="val 18750"/>
+              <a:gd name="adj2" fmla="val -8333"/>
+              <a:gd name="adj3" fmla="val 110337"/>
+              <a:gd name="adj4" fmla="val -37344"/>
+            </a:avLst>
+          </a:prstGeom>
+          <a:noFill/>
+          <a:ln>
+            <a:solidFill>
+              <a:srgbClr val="C00000"/>
+            </a:solidFill>
+          </a:ln>
+        </p:spPr>
+        <p:style>
+          <a:lnRef idx="2">
+            <a:schemeClr val="accent1">
+              <a:shade val="50000"/>
+            </a:schemeClr>
+          </a:lnRef>
+          <a:fillRef idx="1">
+            <a:schemeClr val="accent1"/>
+          </a:fillRef>
+          <a:effectRef idx="0">
+            <a:schemeClr val="accent1"/>
+          </a:effectRef>
+          <a:fontRef idx="minor">
+            <a:schemeClr val="lt1"/>
+          </a:fontRef>
+        </p:style>
+        <p:txBody>
+          <a:bodyPr rtlCol="0" anchor="ctr"/>
+          <a:lstStyle/>
+          <a:p>
+            <a:r>
+              <a:rPr lang="it-IT" sz="1600" dirty="0">
+                <a:solidFill>
+                  <a:schemeClr val="tx1"/>
+                </a:solidFill>
+              </a:rPr>
+              <a:t>La somma degli elementi di una lista è definita come l’addizione tra il primo elemento della lista e la somma di tutti gli altri (fintanto che la lista contiene almeno 1 elemento, altrimenti la somma è 0).</a:t>
+            </a:r>
+          </a:p>
+        </p:txBody>
+      </p:sp>
     </p:spTree>
     <p:extLst>
       <p:ext uri="{BB962C8B-B14F-4D97-AF65-F5344CB8AC3E}">
-        <p14:creationId xmlns:p14="http://schemas.microsoft.com/office/powerpoint/2010/main" val="1437793701"/>
+        <p14:creationId xmlns:p14="http://schemas.microsoft.com/office/powerpoint/2010/main" val="1677720260"/>
       </p:ext>
     </p:extLst>
   </p:cSld>
@@ -4432,146 +5364,305 @@
           <a:lstStyle/>
           <a:p>
             <a:r>
-              <a:rPr lang="it-IT" dirty="0"/>
-              <a:t>C# è un linguaggio di programmazione </a:t>
-            </a:r>
-            <a:r>
               <a:rPr lang="it-IT" b="1" dirty="0">
                 <a:solidFill>
                   <a:srgbClr val="C00000"/>
                 </a:solidFill>
               </a:rPr>
-              <a:t>compilato </a:t>
-            </a:r>
-            <a:r>
-              <a:rPr lang="it-IT" dirty="0"/>
-              <a:t>di tipo </a:t>
-            </a:r>
-            <a:r>
-              <a:rPr lang="it-IT" b="1" dirty="0">
-                <a:solidFill>
-                  <a:srgbClr val="C00000"/>
-                </a:solidFill>
-              </a:rPr>
-              <a:t>imperativo</a:t>
-            </a:r>
-            <a:r>
-              <a:rPr lang="it-IT" dirty="0"/>
-              <a:t>:</a:t>
-            </a:r>
-          </a:p>
-          <a:p>
-            <a:pPr lvl="1"/>
-            <a:r>
-              <a:rPr lang="it-IT" sz="1400" dirty="0"/>
-              <a:t>prescrive le operazioni che il processore deve compiere</a:t>
-            </a:r>
-          </a:p>
-          <a:p>
-            <a:pPr lvl="1"/>
-            <a:r>
-              <a:rPr lang="it-IT" sz="1400" dirty="0"/>
-              <a:t>l'esecuzione delle istruzioni avviene nell’ordine in cui appaiono nel programma</a:t>
-            </a:r>
-            <a:r>
-              <a:rPr lang="it-IT" sz="1400" i="1" dirty="0"/>
-              <a:t> (eccezione: strutture di controllo)</a:t>
-            </a:r>
-            <a:endParaRPr lang="it-IT" sz="1400" dirty="0"/>
-          </a:p>
-          <a:p>
-            <a:pPr marL="0" indent="0">
+              <a:t>Linguaggi dichiarativi (o logici) – Prolog</a:t>
+            </a:r>
+          </a:p>
+          <a:p>
+            <a:pPr marL="717550" indent="0">
               <a:buNone/>
             </a:pPr>
-            <a:endParaRPr lang="it-IT" dirty="0"/>
-          </a:p>
-          <a:p>
-            <a:pPr marL="0" indent="0" algn="ctr">
+            <a:r>
+              <a:rPr lang="it-IT" dirty="0">
+                <a:latin typeface="Courier New" panose="02070309020205020404" pitchFamily="49" charset="0"/>
+                <a:cs typeface="Courier New" panose="02070309020205020404" pitchFamily="49" charset="0"/>
+              </a:rPr>
+              <a:t>lunghezza([],0).</a:t>
+            </a:r>
+            <a:endParaRPr lang="it-IT" sz="1400" dirty="0">
+              <a:latin typeface="Courier New" panose="02070309020205020404" pitchFamily="49" charset="0"/>
+              <a:cs typeface="Courier New" panose="02070309020205020404" pitchFamily="49" charset="0"/>
+            </a:endParaRPr>
+          </a:p>
+          <a:p>
+            <a:pPr marL="717550" indent="0">
               <a:buNone/>
             </a:pPr>
             <a:r>
-              <a:rPr lang="it-IT" b="1" dirty="0">
-                <a:solidFill>
-                  <a:srgbClr val="C00000"/>
-                </a:solidFill>
-              </a:rPr>
-              <a:t>Programma = Algoritmi + Strutture Dati </a:t>
-            </a:r>
-            <a:r>
-              <a:rPr lang="it-IT" b="1" i="1" dirty="0">
-                <a:solidFill>
-                  <a:srgbClr val="C00000"/>
-                </a:solidFill>
-              </a:rPr>
-              <a:t>(N. Wirth, circa 1976)</a:t>
-            </a:r>
-            <a:endParaRPr lang="it-IT" dirty="0">
-              <a:solidFill>
-                <a:srgbClr val="C00000"/>
-              </a:solidFill>
+              <a:rPr lang="it-IT" dirty="0">
+                <a:latin typeface="Courier New" panose="02070309020205020404" pitchFamily="49" charset="0"/>
+                <a:cs typeface="Courier New" panose="02070309020205020404" pitchFamily="49" charset="0"/>
+              </a:rPr>
+              <a:t>lunghezza([_|B],N) :-</a:t>
+            </a:r>
+            <a:endParaRPr lang="it-IT" sz="1400" dirty="0">
+              <a:latin typeface="Courier New" panose="02070309020205020404" pitchFamily="49" charset="0"/>
+              <a:cs typeface="Courier New" panose="02070309020205020404" pitchFamily="49" charset="0"/>
             </a:endParaRPr>
           </a:p>
           <a:p>
-            <a:pPr marL="0" indent="0">
+            <a:pPr marL="717550" indent="0">
               <a:buNone/>
             </a:pPr>
+            <a:r>
+              <a:rPr lang="it-IT" dirty="0">
+                <a:latin typeface="Courier New" panose="02070309020205020404" pitchFamily="49" charset="0"/>
+                <a:cs typeface="Courier New" panose="02070309020205020404" pitchFamily="49" charset="0"/>
+              </a:rPr>
+              <a:t>    </a:t>
+            </a:r>
+            <a:r>
+              <a:rPr lang="it-IT" b="1" dirty="0">
+                <a:latin typeface="Courier New" panose="02070309020205020404" pitchFamily="49" charset="0"/>
+                <a:cs typeface="Courier New" panose="02070309020205020404" pitchFamily="49" charset="0"/>
+              </a:rPr>
+              <a:t>lunghezza(B,N1),</a:t>
+            </a:r>
+            <a:endParaRPr lang="it-IT" sz="1400" b="1" dirty="0">
+              <a:latin typeface="Courier New" panose="02070309020205020404" pitchFamily="49" charset="0"/>
+              <a:cs typeface="Courier New" panose="02070309020205020404" pitchFamily="49" charset="0"/>
+            </a:endParaRPr>
+          </a:p>
+          <a:p>
+            <a:pPr marL="717550" indent="0">
+              <a:buNone/>
+            </a:pPr>
+            <a:r>
+              <a:rPr lang="it-IT" b="1" dirty="0">
+                <a:latin typeface="Courier New" panose="02070309020205020404" pitchFamily="49" charset="0"/>
+                <a:cs typeface="Courier New" panose="02070309020205020404" pitchFamily="49" charset="0"/>
+              </a:rPr>
+              <a:t>    N is N1+1.</a:t>
+            </a:r>
+            <a:endParaRPr lang="it-IT" sz="1400" b="1" dirty="0">
+              <a:latin typeface="Courier New" panose="02070309020205020404" pitchFamily="49" charset="0"/>
+              <a:cs typeface="Courier New" panose="02070309020205020404" pitchFamily="49" charset="0"/>
+            </a:endParaRPr>
+          </a:p>
+          <a:p>
+            <a:pPr marL="717550" indent="0">
+              <a:buNone/>
+            </a:pPr>
+            <a:endParaRPr lang="it-IT" sz="1400" dirty="0">
+              <a:latin typeface="Courier New" panose="02070309020205020404" pitchFamily="49" charset="0"/>
+              <a:cs typeface="Courier New" panose="02070309020205020404" pitchFamily="49" charset="0"/>
+            </a:endParaRPr>
+          </a:p>
+          <a:p>
+            <a:pPr marL="717550" indent="0">
+              <a:buNone/>
+            </a:pPr>
+            <a:r>
+              <a:rPr lang="it-IT" dirty="0">
+                <a:latin typeface="Courier New" panose="02070309020205020404" pitchFamily="49" charset="0"/>
+                <a:cs typeface="Courier New" panose="02070309020205020404" pitchFamily="49" charset="0"/>
+              </a:rPr>
+              <a:t>somma_elem([H|[]],H).</a:t>
+            </a:r>
+            <a:endParaRPr lang="it-IT" sz="1400" dirty="0">
+              <a:latin typeface="Courier New" panose="02070309020205020404" pitchFamily="49" charset="0"/>
+              <a:cs typeface="Courier New" panose="02070309020205020404" pitchFamily="49" charset="0"/>
+            </a:endParaRPr>
+          </a:p>
+          <a:p>
+            <a:pPr marL="717550" indent="0">
+              <a:buNone/>
+            </a:pPr>
+            <a:r>
+              <a:rPr lang="it-IT" dirty="0">
+                <a:latin typeface="Courier New" panose="02070309020205020404" pitchFamily="49" charset="0"/>
+                <a:cs typeface="Courier New" panose="02070309020205020404" pitchFamily="49" charset="0"/>
+              </a:rPr>
+              <a:t>somma_elem([H|T],R) :-</a:t>
+            </a:r>
+            <a:endParaRPr lang="it-IT" sz="1400" dirty="0">
+              <a:latin typeface="Courier New" panose="02070309020205020404" pitchFamily="49" charset="0"/>
+              <a:cs typeface="Courier New" panose="02070309020205020404" pitchFamily="49" charset="0"/>
+            </a:endParaRPr>
+          </a:p>
+          <a:p>
+            <a:pPr marL="717550" indent="0">
+              <a:buNone/>
+            </a:pPr>
+            <a:r>
+              <a:rPr lang="it-IT" dirty="0">
+                <a:latin typeface="Courier New" panose="02070309020205020404" pitchFamily="49" charset="0"/>
+                <a:cs typeface="Courier New" panose="02070309020205020404" pitchFamily="49" charset="0"/>
+              </a:rPr>
+              <a:t>    </a:t>
+            </a:r>
+            <a:r>
+              <a:rPr lang="it-IT" b="1" dirty="0">
+                <a:latin typeface="Courier New" panose="02070309020205020404" pitchFamily="49" charset="0"/>
+                <a:cs typeface="Courier New" panose="02070309020205020404" pitchFamily="49" charset="0"/>
+              </a:rPr>
+              <a:t>somma_elem(T,R1),</a:t>
+            </a:r>
+            <a:endParaRPr lang="it-IT" sz="1400" b="1" dirty="0">
+              <a:latin typeface="Courier New" panose="02070309020205020404" pitchFamily="49" charset="0"/>
+              <a:cs typeface="Courier New" panose="02070309020205020404" pitchFamily="49" charset="0"/>
+            </a:endParaRPr>
+          </a:p>
+          <a:p>
+            <a:pPr marL="717550" indent="0">
+              <a:buNone/>
+            </a:pPr>
+            <a:r>
+              <a:rPr lang="it-IT" b="1" dirty="0">
+                <a:latin typeface="Courier New" panose="02070309020205020404" pitchFamily="49" charset="0"/>
+                <a:cs typeface="Courier New" panose="02070309020205020404" pitchFamily="49" charset="0"/>
+              </a:rPr>
+              <a:t>    R is H+R1.</a:t>
+            </a:r>
+            <a:endParaRPr lang="it-IT" sz="1400" b="1" dirty="0">
+              <a:latin typeface="Courier New" panose="02070309020205020404" pitchFamily="49" charset="0"/>
+              <a:cs typeface="Courier New" panose="02070309020205020404" pitchFamily="49" charset="0"/>
+            </a:endParaRPr>
+          </a:p>
+          <a:p>
+            <a:pPr marL="717550" indent="0">
+              <a:buNone/>
+            </a:pPr>
+            <a:endParaRPr lang="it-IT" sz="1400" dirty="0">
+              <a:latin typeface="Courier New" panose="02070309020205020404" pitchFamily="49" charset="0"/>
+              <a:cs typeface="Courier New" panose="02070309020205020404" pitchFamily="49" charset="0"/>
+            </a:endParaRPr>
+          </a:p>
+          <a:p>
+            <a:pPr marL="717550" indent="0">
+              <a:buNone/>
+            </a:pPr>
+            <a:r>
+              <a:rPr lang="it-IT" dirty="0">
+                <a:latin typeface="Courier New" panose="02070309020205020404" pitchFamily="49" charset="0"/>
+                <a:cs typeface="Courier New" panose="02070309020205020404" pitchFamily="49" charset="0"/>
+              </a:rPr>
+              <a:t>media(L,R) :-</a:t>
+            </a:r>
+            <a:endParaRPr lang="it-IT" sz="1400" dirty="0">
+              <a:latin typeface="Courier New" panose="02070309020205020404" pitchFamily="49" charset="0"/>
+              <a:cs typeface="Courier New" panose="02070309020205020404" pitchFamily="49" charset="0"/>
+            </a:endParaRPr>
+          </a:p>
+          <a:p>
+            <a:pPr marL="717550" indent="0">
+              <a:buNone/>
+            </a:pPr>
+            <a:r>
+              <a:rPr lang="it-IT" dirty="0">
+                <a:latin typeface="Courier New" panose="02070309020205020404" pitchFamily="49" charset="0"/>
+                <a:cs typeface="Courier New" panose="02070309020205020404" pitchFamily="49" charset="0"/>
+              </a:rPr>
+              <a:t>    </a:t>
+            </a:r>
+            <a:r>
+              <a:rPr lang="it-IT" b="1" dirty="0">
+                <a:latin typeface="Courier New" panose="02070309020205020404" pitchFamily="49" charset="0"/>
+                <a:cs typeface="Courier New" panose="02070309020205020404" pitchFamily="49" charset="0"/>
+              </a:rPr>
+              <a:t>somma_elem(L,S),</a:t>
+            </a:r>
+            <a:endParaRPr lang="it-IT" sz="1400" b="1" dirty="0">
+              <a:latin typeface="Courier New" panose="02070309020205020404" pitchFamily="49" charset="0"/>
+              <a:cs typeface="Courier New" panose="02070309020205020404" pitchFamily="49" charset="0"/>
+            </a:endParaRPr>
+          </a:p>
+          <a:p>
+            <a:pPr marL="717550" indent="0">
+              <a:buNone/>
+            </a:pPr>
+            <a:r>
+              <a:rPr lang="it-IT" b="1" dirty="0">
+                <a:latin typeface="Courier New" panose="02070309020205020404" pitchFamily="49" charset="0"/>
+                <a:cs typeface="Courier New" panose="02070309020205020404" pitchFamily="49" charset="0"/>
+              </a:rPr>
+              <a:t>    lunghezza(L,C),</a:t>
+            </a:r>
+            <a:endParaRPr lang="it-IT" sz="1400" b="1" dirty="0">
+              <a:latin typeface="Courier New" panose="02070309020205020404" pitchFamily="49" charset="0"/>
+              <a:cs typeface="Courier New" panose="02070309020205020404" pitchFamily="49" charset="0"/>
+            </a:endParaRPr>
+          </a:p>
+          <a:p>
+            <a:pPr marL="717550" indent="0">
+              <a:buNone/>
+            </a:pPr>
+            <a:r>
+              <a:rPr lang="it-IT" b="1" dirty="0">
+                <a:latin typeface="Courier New" panose="02070309020205020404" pitchFamily="49" charset="0"/>
+                <a:cs typeface="Courier New" panose="02070309020205020404" pitchFamily="49" charset="0"/>
+              </a:rPr>
+              <a:t>    R is S/C.</a:t>
+            </a:r>
+            <a:endParaRPr lang="it-IT" sz="1400" b="1" dirty="0">
+              <a:latin typeface="Courier New" panose="02070309020205020404" pitchFamily="49" charset="0"/>
+              <a:cs typeface="Courier New" panose="02070309020205020404" pitchFamily="49" charset="0"/>
+            </a:endParaRPr>
+          </a:p>
+          <a:p>
+            <a:pPr marL="717550" indent="0">
+              <a:buNone/>
+            </a:pPr>
+            <a:endParaRPr lang="it-IT" sz="1400" dirty="0">
+              <a:latin typeface="Courier New" panose="02070309020205020404" pitchFamily="49" charset="0"/>
+              <a:cs typeface="Courier New" panose="02070309020205020404" pitchFamily="49" charset="0"/>
+            </a:endParaRPr>
+          </a:p>
+          <a:p>
+            <a:pPr marL="717550" indent="0">
+              <a:buNone/>
+            </a:pPr>
+            <a:r>
+              <a:rPr lang="it-IT" dirty="0">
+                <a:latin typeface="Courier New" panose="02070309020205020404" pitchFamily="49" charset="0"/>
+                <a:cs typeface="Courier New" panose="02070309020205020404" pitchFamily="49" charset="0"/>
+              </a:rPr>
+              <a:t>?- media([1,2,3,4],R).</a:t>
+            </a:r>
             <a:br>
-              <a:rPr lang="it-IT" dirty="0"/>
+              <a:rPr lang="it-IT" sz="1400" dirty="0">
+                <a:latin typeface="Courier New" panose="02070309020205020404" pitchFamily="49" charset="0"/>
+                <a:cs typeface="Courier New" panose="02070309020205020404" pitchFamily="49" charset="0"/>
+              </a:rPr>
             </a:br>
-            <a:endParaRPr lang="it-IT" dirty="0"/>
-          </a:p>
-          <a:p>
-            <a:r>
-              <a:rPr lang="it-IT" dirty="0"/>
-              <a:t>La struttura del programma consiste in:</a:t>
-            </a:r>
-          </a:p>
-          <a:p>
-            <a:pPr lvl="1"/>
-            <a:r>
-              <a:rPr lang="it-IT" sz="1400" dirty="0"/>
-              <a:t>una parte di dichiarazione in cui si dichiarano tutte le variabili del programma e il loro tipo</a:t>
-            </a:r>
-          </a:p>
-          <a:p>
-            <a:pPr lvl="1"/>
-            <a:r>
-              <a:rPr lang="it-IT" sz="1400" dirty="0"/>
-              <a:t>una parte che descrive l’algoritmo risolutivo utilizzato, mediante istruzioni del linguaggio. Le istruzioni si dividono in:</a:t>
-            </a:r>
-          </a:p>
-          <a:p>
-            <a:pPr lvl="2"/>
-            <a:r>
-              <a:rPr lang="it-IT" sz="1400" dirty="0"/>
-              <a:t>istruzioni di lettura e scrittura</a:t>
-            </a:r>
-          </a:p>
-          <a:p>
-            <a:pPr lvl="2"/>
-            <a:r>
-              <a:rPr lang="it-IT" sz="1400" dirty="0"/>
-              <a:t>istruzioni di assegnamento (astrazione di cella di memoria)</a:t>
-            </a:r>
-          </a:p>
-          <a:p>
-            <a:pPr lvl="2"/>
-            <a:r>
-              <a:rPr lang="it-IT" sz="1400" dirty="0"/>
-              <a:t>istruzioni di controllo</a:t>
-            </a:r>
-            <a:br>
-              <a:rPr lang="it-IT" dirty="0"/>
-            </a:br>
-            <a:endParaRPr lang="it-IT" b="0" dirty="0">
-              <a:effectLst/>
+            <a:endParaRPr lang="it-IT" sz="1400" dirty="0">
+              <a:latin typeface="Courier New" panose="02070309020205020404" pitchFamily="49" charset="0"/>
+              <a:cs typeface="Courier New" panose="02070309020205020404" pitchFamily="49" charset="0"/>
             </a:endParaRPr>
           </a:p>
         </p:txBody>
       </p:sp>
       <p:sp>
         <p:nvSpPr>
-          <p:cNvPr id="9" name="Title 2"/>
+          <p:cNvPr id="5" name="Slide Number Placeholder 4"/>
+          <p:cNvSpPr>
+            <a:spLocks noGrp="1"/>
+          </p:cNvSpPr>
+          <p:nvPr>
+            <p:ph type="sldNum" sz="quarter" idx="12"/>
+          </p:nvPr>
+        </p:nvSpPr>
+        <p:spPr/>
+        <p:txBody>
+          <a:bodyPr/>
+          <a:lstStyle/>
+          <a:p>
+            <a:fld id="{FB20157B-BF21-4976-810E-1ABA2FD4E36F}" type="slidenum">
+              <a:rPr lang="it-IT" smtClean="0"/>
+              <a:pPr/>
+              <a:t>8</a:t>
+            </a:fld>
+            <a:endParaRPr lang="it-IT"/>
+          </a:p>
+        </p:txBody>
+      </p:sp>
+      <p:sp>
+        <p:nvSpPr>
+          <p:cNvPr id="6" name="Title 5"/>
           <p:cNvSpPr>
             <a:spLocks noGrp="1"/>
           </p:cNvSpPr>
@@ -4585,48 +5676,189 @@
           <a:lstStyle/>
           <a:p>
             <a:r>
-              <a:rPr lang="it-IT" dirty="0"/>
-              <a:t>Il linguaggio C#</a:t>
-            </a:r>
-            <a:endParaRPr lang="it-IT" dirty="0">
-              <a:effectLst/>
-            </a:endParaRPr>
+              <a:rPr lang="it-IT" sz="3600" dirty="0">
+                <a:latin typeface="Calibri" panose="020F0502020204030204" pitchFamily="34" charset="0"/>
+              </a:rPr>
+              <a:t>Media dei valori di una lista</a:t>
+            </a:r>
           </a:p>
         </p:txBody>
       </p:sp>
       <p:sp>
         <p:nvSpPr>
-          <p:cNvPr id="6" name="Slide Number Placeholder 4"/>
-          <p:cNvSpPr>
-            <a:spLocks noGrp="1"/>
-          </p:cNvSpPr>
-          <p:nvPr>
-            <p:ph type="sldNum" sz="quarter" idx="12"/>
-          </p:nvPr>
+          <p:cNvPr id="7" name="Callout: Line 6"/>
+          <p:cNvSpPr/>
+          <p:nvPr/>
         </p:nvSpPr>
         <p:spPr>
           <a:xfrm>
-            <a:off x="9027918" y="6590846"/>
-            <a:ext cx="855983" cy="143633"/>
+            <a:off x="6246248" y="5220469"/>
+            <a:ext cx="5040560" cy="842031"/>
           </a:xfrm>
+          <a:prstGeom prst="borderCallout1">
+            <a:avLst>
+              <a:gd name="adj1" fmla="val 18750"/>
+              <a:gd name="adj2" fmla="val -8333"/>
+              <a:gd name="adj3" fmla="val -25319"/>
+              <a:gd name="adj4" fmla="val -47047"/>
+            </a:avLst>
+          </a:prstGeom>
+          <a:noFill/>
+          <a:ln>
+            <a:solidFill>
+              <a:srgbClr val="C00000"/>
+            </a:solidFill>
+          </a:ln>
         </p:spPr>
+        <p:style>
+          <a:lnRef idx="2">
+            <a:schemeClr val="accent1">
+              <a:shade val="50000"/>
+            </a:schemeClr>
+          </a:lnRef>
+          <a:fillRef idx="1">
+            <a:schemeClr val="accent1"/>
+          </a:fillRef>
+          <a:effectRef idx="0">
+            <a:schemeClr val="accent1"/>
+          </a:effectRef>
+          <a:fontRef idx="minor">
+            <a:schemeClr val="lt1"/>
+          </a:fontRef>
+        </p:style>
         <p:txBody>
-          <a:bodyPr/>
+          <a:bodyPr rtlCol="0" anchor="ctr"/>
           <a:lstStyle/>
           <a:p>
-            <a:fld id="{FB20157B-BF21-4976-810E-1ABA2FD4E36F}" type="slidenum">
-              <a:rPr lang="it-IT" smtClean="0"/>
-              <a:pPr/>
-              <a:t>8</a:t>
-            </a:fld>
-            <a:endParaRPr lang="it-IT"/>
+            <a:r>
+              <a:rPr lang="it-IT" sz="1600" dirty="0">
+                <a:solidFill>
+                  <a:schemeClr val="tx1"/>
+                </a:solidFill>
+              </a:rPr>
+              <a:t>Se S è la somma degli elementi dell’array e C è il numero di elementi dell’array, allora la media è definita come S/C.</a:t>
+            </a:r>
+          </a:p>
+        </p:txBody>
+      </p:sp>
+      <p:sp>
+        <p:nvSpPr>
+          <p:cNvPr id="8" name="Callout: Line 7"/>
+          <p:cNvSpPr/>
+          <p:nvPr/>
+        </p:nvSpPr>
+        <p:spPr>
+          <a:xfrm>
+            <a:off x="6288238" y="3741399"/>
+            <a:ext cx="5040560" cy="842031"/>
+          </a:xfrm>
+          <a:prstGeom prst="borderCallout1">
+            <a:avLst>
+              <a:gd name="adj1" fmla="val 18750"/>
+              <a:gd name="adj2" fmla="val -8333"/>
+              <a:gd name="adj3" fmla="val 6249"/>
+              <a:gd name="adj4" fmla="val -46203"/>
+            </a:avLst>
+          </a:prstGeom>
+          <a:noFill/>
+          <a:ln>
+            <a:solidFill>
+              <a:srgbClr val="C00000"/>
+            </a:solidFill>
+          </a:ln>
+        </p:spPr>
+        <p:style>
+          <a:lnRef idx="2">
+            <a:schemeClr val="accent1">
+              <a:shade val="50000"/>
+            </a:schemeClr>
+          </a:lnRef>
+          <a:fillRef idx="1">
+            <a:schemeClr val="accent1"/>
+          </a:fillRef>
+          <a:effectRef idx="0">
+            <a:schemeClr val="accent1"/>
+          </a:effectRef>
+          <a:fontRef idx="minor">
+            <a:schemeClr val="lt1"/>
+          </a:fontRef>
+        </p:style>
+        <p:txBody>
+          <a:bodyPr rtlCol="0" anchor="ctr"/>
+          <a:lstStyle/>
+          <a:p>
+            <a:r>
+              <a:rPr lang="it-IT" sz="1600" dirty="0">
+                <a:solidFill>
+                  <a:schemeClr val="tx1"/>
+                </a:solidFill>
+              </a:rPr>
+              <a:t>Se H è il primo elemento della lista e T tutti gli altri, allora la somma dei valori della lista è definita come H più la somma degli elementi della lista T.</a:t>
+            </a:r>
+          </a:p>
+        </p:txBody>
+      </p:sp>
+      <p:sp>
+        <p:nvSpPr>
+          <p:cNvPr id="9" name="Callout: Line 8"/>
+          <p:cNvSpPr/>
+          <p:nvPr/>
+        </p:nvSpPr>
+        <p:spPr>
+          <a:xfrm>
+            <a:off x="6288238" y="1476053"/>
+            <a:ext cx="5040560" cy="1052539"/>
+          </a:xfrm>
+          <a:prstGeom prst="borderCallout1">
+            <a:avLst>
+              <a:gd name="adj1" fmla="val 18750"/>
+              <a:gd name="adj2" fmla="val -8333"/>
+              <a:gd name="adj3" fmla="val 81002"/>
+              <a:gd name="adj4" fmla="val -47891"/>
+            </a:avLst>
+          </a:prstGeom>
+          <a:noFill/>
+          <a:ln>
+            <a:solidFill>
+              <a:srgbClr val="C00000"/>
+            </a:solidFill>
+          </a:ln>
+        </p:spPr>
+        <p:style>
+          <a:lnRef idx="2">
+            <a:schemeClr val="accent1">
+              <a:shade val="50000"/>
+            </a:schemeClr>
+          </a:lnRef>
+          <a:fillRef idx="1">
+            <a:schemeClr val="accent1"/>
+          </a:fillRef>
+          <a:effectRef idx="0">
+            <a:schemeClr val="accent1"/>
+          </a:effectRef>
+          <a:fontRef idx="minor">
+            <a:schemeClr val="lt1"/>
+          </a:fontRef>
+        </p:style>
+        <p:txBody>
+          <a:bodyPr rtlCol="0" anchor="ctr"/>
+          <a:lstStyle/>
+          <a:p>
+            <a:r>
+              <a:rPr lang="it-IT" sz="1600" dirty="0">
+                <a:solidFill>
+                  <a:schemeClr val="tx1"/>
+                </a:solidFill>
+              </a:rPr>
+              <a:t>Se B è un array che contiene tutti gli elementi dell’array passato come parametro, meno il primo, allora la linghezza dell’array originario è la lunghezza di B più 1.</a:t>
+            </a:r>
           </a:p>
         </p:txBody>
       </p:sp>
     </p:spTree>
     <p:extLst>
       <p:ext uri="{BB962C8B-B14F-4D97-AF65-F5344CB8AC3E}">
-        <p14:creationId xmlns:p14="http://schemas.microsoft.com/office/powerpoint/2010/main" val="2524100352"/>
+        <p14:creationId xmlns:p14="http://schemas.microsoft.com/office/powerpoint/2010/main" val="3647405351"/>
       </p:ext>
     </p:extLst>
   </p:cSld>
@@ -4655,7 +5887,160 @@
       </p:grpSpPr>
       <p:sp>
         <p:nvSpPr>
-          <p:cNvPr id="9" name="Title 2"/>
+          <p:cNvPr id="2" name="Content Placeholder 1"/>
+          <p:cNvSpPr>
+            <a:spLocks noGrp="1"/>
+          </p:cNvSpPr>
+          <p:nvPr>
+            <p:ph idx="1"/>
+          </p:nvPr>
+        </p:nvSpPr>
+        <p:spPr/>
+        <p:txBody>
+          <a:bodyPr/>
+          <a:lstStyle/>
+          <a:p>
+            <a:r>
+              <a:rPr lang="it-IT" b="1" dirty="0">
+                <a:solidFill>
+                  <a:srgbClr val="C00000"/>
+                </a:solidFill>
+              </a:rPr>
+              <a:t>Caratteristiche interne</a:t>
+            </a:r>
+            <a:endParaRPr lang="it-IT" dirty="0">
+              <a:solidFill>
+                <a:srgbClr val="C00000"/>
+              </a:solidFill>
+            </a:endParaRPr>
+          </a:p>
+          <a:p>
+            <a:pPr lvl="1"/>
+            <a:r>
+              <a:rPr lang="it-IT" sz="1400" b="1" dirty="0"/>
+              <a:t>Espressività/Leggibilità</a:t>
+            </a:r>
+            <a:r>
+              <a:rPr lang="it-IT" sz="1400" dirty="0"/>
+              <a:t>: facilità e semplicità con cui si può scrivere e leggere un dato algoritmo</a:t>
+            </a:r>
+          </a:p>
+          <a:p>
+            <a:pPr lvl="1"/>
+            <a:r>
+              <a:rPr lang="it-IT" sz="1400" b="1" dirty="0"/>
+              <a:t>Robustezza:</a:t>
+            </a:r>
+            <a:r>
+              <a:rPr lang="it-IT" sz="1400" dirty="0"/>
+              <a:t> capacità del linguaggio di prevenire, nei limiti del possibile, gli errori di programmazione.</a:t>
+            </a:r>
+          </a:p>
+          <a:p>
+            <a:pPr lvl="1"/>
+            <a:r>
+              <a:rPr lang="it-IT" sz="1400" b="1" dirty="0"/>
+              <a:t>Modularità/Flessibilità:</a:t>
+            </a:r>
+            <a:r>
+              <a:rPr lang="it-IT" sz="1400" dirty="0"/>
+              <a:t> possibilità di creare modulo ed estendere il linguaggio.</a:t>
+            </a:r>
+          </a:p>
+          <a:p>
+            <a:pPr lvl="1"/>
+            <a:r>
+              <a:rPr lang="it-IT" sz="1400" b="1" dirty="0"/>
+              <a:t>Efficienza:</a:t>
+            </a:r>
+            <a:r>
+              <a:rPr lang="it-IT" sz="1400" dirty="0"/>
+              <a:t> la velocità di esecuzione e l'uso oculato delle risorse del sistema su cui il programma finito gira.</a:t>
+            </a:r>
+          </a:p>
+          <a:p>
+            <a:pPr marL="601150" lvl="1" indent="0">
+              <a:buNone/>
+            </a:pPr>
+            <a:endParaRPr lang="it-IT" sz="1400" dirty="0"/>
+          </a:p>
+          <a:p>
+            <a:r>
+              <a:rPr lang="it-IT" b="1" dirty="0">
+                <a:solidFill>
+                  <a:srgbClr val="C00000"/>
+                </a:solidFill>
+              </a:rPr>
+              <a:t>Caratteristiche esterne</a:t>
+            </a:r>
+            <a:endParaRPr lang="it-IT" dirty="0">
+              <a:solidFill>
+                <a:srgbClr val="C00000"/>
+              </a:solidFill>
+            </a:endParaRPr>
+          </a:p>
+          <a:p>
+            <a:pPr lvl="1"/>
+            <a:r>
+              <a:rPr lang="it-IT" sz="1400" b="1" dirty="0"/>
+              <a:t>Diffusione:</a:t>
+            </a:r>
+            <a:r>
+              <a:rPr lang="it-IT" sz="1400" dirty="0"/>
+              <a:t> livello di utilizzo del linguaggio nelle varie comunità.</a:t>
+            </a:r>
+          </a:p>
+          <a:p>
+            <a:pPr lvl="1"/>
+            <a:r>
+              <a:rPr lang="it-IT" sz="1400" b="1" dirty="0"/>
+              <a:t>Standardizzazione:</a:t>
+            </a:r>
+            <a:r>
+              <a:rPr lang="it-IT" sz="1400" dirty="0"/>
+              <a:t> livello di uniformità del linguaggio.</a:t>
+            </a:r>
+          </a:p>
+          <a:p>
+            <a:pPr lvl="1"/>
+            <a:r>
+              <a:rPr lang="it-IT" sz="1400" b="1" dirty="0"/>
+              <a:t>Portabilità:</a:t>
+            </a:r>
+            <a:r>
+              <a:rPr lang="it-IT" sz="1400" dirty="0"/>
+              <a:t> possibilità di portare il codice scritto su una certa piattaforma (CPU + architettura + sistema operativo) su un'altra</a:t>
+            </a:r>
+          </a:p>
+        </p:txBody>
+      </p:sp>
+      <p:sp>
+        <p:nvSpPr>
+          <p:cNvPr id="5" name="Slide Number Placeholder 4"/>
+          <p:cNvSpPr>
+            <a:spLocks noGrp="1"/>
+          </p:cNvSpPr>
+          <p:nvPr>
+            <p:ph type="sldNum" sz="quarter" idx="12"/>
+          </p:nvPr>
+        </p:nvSpPr>
+        <p:spPr/>
+        <p:txBody>
+          <a:bodyPr/>
+          <a:lstStyle/>
+          <a:p>
+            <a:fld id="{FB20157B-BF21-4976-810E-1ABA2FD4E36F}" type="slidenum">
+              <a:rPr lang="it-IT" smtClean="0"/>
+              <a:pPr/>
+              <a:t>9</a:t>
+            </a:fld>
+            <a:endParaRPr lang="it-IT"/>
+          </a:p>
+        </p:txBody>
+      </p:sp>
+      <p:sp>
+        <p:nvSpPr>
+          <p:cNvPr id="6" name="Title 5"/>
           <p:cNvSpPr>
             <a:spLocks noGrp="1"/>
           </p:cNvSpPr>
@@ -4669,89 +6054,18 @@
           <a:lstStyle/>
           <a:p>
             <a:r>
-              <a:rPr lang="it-IT" dirty="0"/>
-              <a:t>I linguaggi a Virtual machine</a:t>
-            </a:r>
-            <a:endParaRPr lang="it-IT" dirty="0">
-              <a:effectLst/>
-            </a:endParaRPr>
+              <a:rPr lang="it-IT" sz="3600" dirty="0">
+                <a:latin typeface="Calibri" panose="020F0502020204030204" pitchFamily="34" charset="0"/>
+              </a:rPr>
+              <a:t>Perchè tanti linguaggi diversi?</a:t>
+            </a:r>
           </a:p>
         </p:txBody>
       </p:sp>
-      <p:sp>
-        <p:nvSpPr>
-          <p:cNvPr id="6" name="Slide Number Placeholder 4"/>
-          <p:cNvSpPr>
-            <a:spLocks noGrp="1"/>
-          </p:cNvSpPr>
-          <p:nvPr>
-            <p:ph type="sldNum" sz="quarter" idx="12"/>
-          </p:nvPr>
-        </p:nvSpPr>
-        <p:spPr>
-          <a:xfrm>
-            <a:off x="9027918" y="6590846"/>
-            <a:ext cx="855983" cy="143633"/>
-          </a:xfrm>
-        </p:spPr>
-        <p:txBody>
-          <a:bodyPr/>
-          <a:lstStyle/>
-          <a:p>
-            <a:fld id="{FB20157B-BF21-4976-810E-1ABA2FD4E36F}" type="slidenum">
-              <a:rPr lang="it-IT" smtClean="0"/>
-              <a:pPr/>
-              <a:t>9</a:t>
-            </a:fld>
-            <a:endParaRPr lang="it-IT"/>
-          </a:p>
-        </p:txBody>
-      </p:sp>
-      <p:pic>
-        <p:nvPicPr>
-          <p:cNvPr id="2050" name="Picture 2" descr="Dal codice C# all'esecuzione nel computer"/>
-          <p:cNvPicPr>
-            <a:picLocks noChangeAspect="1" noChangeArrowheads="1"/>
-          </p:cNvPicPr>
-          <p:nvPr/>
-        </p:nvPicPr>
-        <p:blipFill>
-          <a:blip r:embed="rId2">
-            <a:extLst>
-              <a:ext uri="{28A0092B-C50C-407E-A947-70E740481C1C}">
-                <a14:useLocalDpi xmlns:a14="http://schemas.microsoft.com/office/drawing/2010/main" val="0"/>
-              </a:ext>
-            </a:extLst>
-          </a:blip>
-          <a:srcRect/>
-          <a:stretch>
-            <a:fillRect/>
-          </a:stretch>
-        </p:blipFill>
-        <p:spPr bwMode="auto">
-          <a:xfrm>
-            <a:off x="3115182" y="1001091"/>
-            <a:ext cx="5904656" cy="5273423"/>
-          </a:xfrm>
-          <a:prstGeom prst="rect">
-            <a:avLst/>
-          </a:prstGeom>
-          <a:noFill/>
-          <a:extLst>
-            <a:ext uri="{909E8E84-426E-40DD-AFC4-6F175D3DCCD1}">
-              <a14:hiddenFill xmlns:a14="http://schemas.microsoft.com/office/drawing/2010/main">
-                <a:solidFill>
-                  <a:srgbClr val="FFFFFF"/>
-                </a:solidFill>
-              </a14:hiddenFill>
-            </a:ext>
-          </a:extLst>
-        </p:spPr>
-      </p:pic>
     </p:spTree>
     <p:extLst>
       <p:ext uri="{BB962C8B-B14F-4D97-AF65-F5344CB8AC3E}">
-        <p14:creationId xmlns:p14="http://schemas.microsoft.com/office/powerpoint/2010/main" val="3193027289"/>
+        <p14:creationId xmlns:p14="http://schemas.microsoft.com/office/powerpoint/2010/main" val="2474470146"/>
       </p:ext>
     </p:extLst>
   </p:cSld>
@@ -5899,6 +7213,12 @@
 </file>
 
 <file path=customXml/item1.xml><?xml version="1.0" encoding="utf-8"?>
+<p:properties xmlns:p="http://schemas.microsoft.com/office/2006/metadata/properties" xmlns:xsi="http://www.w3.org/2001/XMLSchema-instance" xmlns:pc="http://schemas.microsoft.com/office/infopath/2007/PartnerControls">
+  <documentManagement/>
+</p:properties>
+</file>
+
+<file path=customXml/item2.xml><?xml version="1.0" encoding="utf-8"?>
 <ct:contentTypeSchema xmlns:ct="http://schemas.microsoft.com/office/2006/metadata/contentType" xmlns:ma="http://schemas.microsoft.com/office/2006/metadata/properties/metaAttributes" ct:_="" ma:_="" ma:contentTypeName="Document" ma:contentTypeID="0x010100D3F842D2DECB264FA3B88BEF4917C2E0" ma:contentTypeVersion="0" ma:contentTypeDescription="Create a new document." ma:contentTypeScope="" ma:versionID="5caae4c1d66e398fa96cbdbff08805c9">
   <xsd:schema xmlns:xsd="http://www.w3.org/2001/XMLSchema" xmlns:xs="http://www.w3.org/2001/XMLSchema" xmlns:p="http://schemas.microsoft.com/office/2006/metadata/properties" targetNamespace="http://schemas.microsoft.com/office/2006/metadata/properties" ma:root="true" ma:fieldsID="c64490b4aec6201516c3a874156f37b2">
     <xsd:element name="properties">
@@ -6012,12 +7332,6 @@
 </ct:contentTypeSchema>
 </file>
 
-<file path=customXml/item2.xml><?xml version="1.0" encoding="utf-8"?>
-<p:properties xmlns:p="http://schemas.microsoft.com/office/2006/metadata/properties" xmlns:xsi="http://www.w3.org/2001/XMLSchema-instance" xmlns:pc="http://schemas.microsoft.com/office/infopath/2007/PartnerControls">
-  <documentManagement/>
-</p:properties>
-</file>
-
 <file path=customXml/item3.xml><?xml version="1.0" encoding="utf-8"?>
 <?mso-contentType ?>
 <FormTemplates xmlns="http://schemas.microsoft.com/sharepoint/v3/contenttype/forms">
@@ -6028,6 +7342,21 @@
 </file>
 
 <file path=customXml/itemProps1.xml><?xml version="1.0" encoding="utf-8"?>
+<ds:datastoreItem xmlns:ds="http://schemas.openxmlformats.org/officeDocument/2006/customXml" ds:itemID="{EEAC1E32-0142-4827-B761-C86BDAF25AFB}">
+  <ds:schemaRefs>
+    <ds:schemaRef ds:uri="http://schemas.microsoft.com/office/2006/documentManagement/types"/>
+    <ds:schemaRef ds:uri="http://www.w3.org/XML/1998/namespace"/>
+    <ds:schemaRef ds:uri="http://purl.org/dc/terms/"/>
+    <ds:schemaRef ds:uri="http://purl.org/dc/elements/1.1/"/>
+    <ds:schemaRef ds:uri="http://purl.org/dc/dcmitype/"/>
+    <ds:schemaRef ds:uri="http://schemas.microsoft.com/office/infopath/2007/PartnerControls"/>
+    <ds:schemaRef ds:uri="http://schemas.openxmlformats.org/package/2006/metadata/core-properties"/>
+    <ds:schemaRef ds:uri="http://schemas.microsoft.com/office/2006/metadata/properties"/>
+  </ds:schemaRefs>
+</ds:datastoreItem>
+</file>
+
+<file path=customXml/itemProps2.xml><?xml version="1.0" encoding="utf-8"?>
 <ds:datastoreItem xmlns:ds="http://schemas.openxmlformats.org/officeDocument/2006/customXml" ds:itemID="{5F279C50-D5EA-46DF-ADB8-A5D06C18EB85}">
   <ds:schemaRefs>
     <ds:schemaRef ds:uri="http://schemas.microsoft.com/office/2006/metadata/contentType"/>
@@ -6043,21 +7372,6 @@
 </ds:datastoreItem>
 </file>
 
-<file path=customXml/itemProps2.xml><?xml version="1.0" encoding="utf-8"?>
-<ds:datastoreItem xmlns:ds="http://schemas.openxmlformats.org/officeDocument/2006/customXml" ds:itemID="{EEAC1E32-0142-4827-B761-C86BDAF25AFB}">
-  <ds:schemaRefs>
-    <ds:schemaRef ds:uri="http://schemas.microsoft.com/office/2006/documentManagement/types"/>
-    <ds:schemaRef ds:uri="http://www.w3.org/XML/1998/namespace"/>
-    <ds:schemaRef ds:uri="http://purl.org/dc/terms/"/>
-    <ds:schemaRef ds:uri="http://purl.org/dc/elements/1.1/"/>
-    <ds:schemaRef ds:uri="http://purl.org/dc/dcmitype/"/>
-    <ds:schemaRef ds:uri="http://schemas.microsoft.com/office/infopath/2007/PartnerControls"/>
-    <ds:schemaRef ds:uri="http://schemas.openxmlformats.org/package/2006/metadata/core-properties"/>
-    <ds:schemaRef ds:uri="http://schemas.microsoft.com/office/2006/metadata/properties"/>
-  </ds:schemaRefs>
-</ds:datastoreItem>
-</file>
-
 <file path=customXml/itemProps3.xml><?xml version="1.0" encoding="utf-8"?>
 <ds:datastoreItem xmlns:ds="http://schemas.openxmlformats.org/officeDocument/2006/customXml" ds:itemID="{6284E3BA-FE6E-4F67-9072-1F25BCD921CF}">
   <ds:schemaRefs>

</xml_diff>